<commit_message>
add graphs to pres
</commit_message>
<xml_diff>
--- a/presentation.pptx
+++ b/presentation.pptx
@@ -11,8 +11,10 @@
     <p:sldId id="262" r:id="rId5"/>
     <p:sldId id="257" r:id="rId6"/>
     <p:sldId id="263" r:id="rId7"/>
-    <p:sldId id="264" r:id="rId8"/>
-    <p:sldId id="265" r:id="rId9"/>
+    <p:sldId id="268" r:id="rId8"/>
+    <p:sldId id="269" r:id="rId9"/>
+    <p:sldId id="264" r:id="rId10"/>
+    <p:sldId id="265" r:id="rId11"/>
   </p:sldIdLst>
   <p:sldSz cx="12192000" cy="6858000"/>
   <p:notesSz cx="6858000" cy="9144000"/>
@@ -930,7 +932,7 @@
 <dgm:dataModel xmlns:dgm="http://schemas.openxmlformats.org/drawingml/2006/diagram" xmlns:a="http://schemas.openxmlformats.org/drawingml/2006/main">
   <dgm:ptLst>
     <dgm:pt modelId="{04B8BE75-06E6-46C1-9237-0B17B1DA8F24}" type="doc">
-      <dgm:prSet loTypeId="urn:microsoft.com/office/officeart/2005/8/layout/vProcess5" loCatId="process" qsTypeId="urn:microsoft.com/office/officeart/2005/8/quickstyle/3d3" qsCatId="3D" csTypeId="urn:microsoft.com/office/officeart/2005/8/colors/accent0_2" csCatId="mainScheme" phldr="1"/>
+      <dgm:prSet loTypeId="urn:microsoft.com/office/officeart/2005/8/layout/process4" loCatId="process" qsTypeId="urn:microsoft.com/office/officeart/2005/8/quickstyle/3d3" qsCatId="3D" csTypeId="urn:microsoft.com/office/officeart/2005/8/colors/accent0_2" csCatId="mainScheme" phldr="1"/>
       <dgm:spPr/>
       <dgm:t>
         <a:bodyPr/>
@@ -949,7 +951,19 @@
         <a:p>
           <a:r>
             <a:rPr lang="en-US" dirty="0"/>
-            <a:t>What genres have the strongest correlation with ROI?</a:t>
+            <a:t>What </a:t>
+          </a:r>
+          <a:r>
+            <a:rPr lang="en-US" dirty="0">
+              <a:solidFill>
+                <a:schemeClr val="tx1"/>
+              </a:solidFill>
+            </a:rPr>
+            <a:t>genres</a:t>
+          </a:r>
+          <a:r>
+            <a:rPr lang="en-US" dirty="0"/>
+            <a:t> have the strongest correlation with ROI?</a:t>
           </a:r>
         </a:p>
       </dgm:t>
@@ -984,7 +998,7 @@
         <a:lstStyle/>
         <a:p>
           <a:r>
-            <a:rPr lang="en-US"/>
+            <a:rPr lang="en-US" dirty="0"/>
             <a:t>How does budget affect these correlations?</a:t>
           </a:r>
         </a:p>
@@ -1020,7 +1034,7 @@
         <a:lstStyle/>
         <a:p>
           <a:r>
-            <a:rPr lang="en-US"/>
+            <a:rPr lang="en-US" dirty="0"/>
             <a:t>Are high or low-budget films more profitable?</a:t>
           </a:r>
         </a:p>
@@ -1048,109 +1062,65 @@
         </a:p>
       </dgm:t>
     </dgm:pt>
-    <dgm:pt modelId="{10C74380-038D-4076-87B8-FAA5F8EB9261}" type="pres">
-      <dgm:prSet presAssocID="{04B8BE75-06E6-46C1-9237-0B17B1DA8F24}" presName="outerComposite" presStyleCnt="0">
+    <dgm:pt modelId="{6222796C-289A-43BE-90FA-15C2A0DE6642}" type="pres">
+      <dgm:prSet presAssocID="{04B8BE75-06E6-46C1-9237-0B17B1DA8F24}" presName="Name0" presStyleCnt="0">
         <dgm:presLayoutVars>
-          <dgm:chMax val="5"/>
           <dgm:dir/>
+          <dgm:animLvl val="lvl"/>
           <dgm:resizeHandles val="exact"/>
         </dgm:presLayoutVars>
       </dgm:prSet>
       <dgm:spPr/>
     </dgm:pt>
-    <dgm:pt modelId="{F574FEFA-9519-46C8-BCB9-1773EC3A357C}" type="pres">
-      <dgm:prSet presAssocID="{04B8BE75-06E6-46C1-9237-0B17B1DA8F24}" presName="dummyMaxCanvas" presStyleCnt="0">
-        <dgm:presLayoutVars/>
-      </dgm:prSet>
+    <dgm:pt modelId="{B4F34417-8930-4675-B1CA-26C25EB7C749}" type="pres">
+      <dgm:prSet presAssocID="{A905BB1F-32BA-4317-B1D7-55F01CB3DC42}" presName="boxAndChildren" presStyleCnt="0"/>
       <dgm:spPr/>
     </dgm:pt>
-    <dgm:pt modelId="{31D0451B-0462-4FDC-9049-527E5A391790}" type="pres">
-      <dgm:prSet presAssocID="{04B8BE75-06E6-46C1-9237-0B17B1DA8F24}" presName="ThreeNodes_1" presStyleLbl="node1" presStyleIdx="0" presStyleCnt="3" custLinFactNeighborX="-10528" custLinFactNeighborY="-4478">
-        <dgm:presLayoutVars>
-          <dgm:bulletEnabled val="1"/>
-        </dgm:presLayoutVars>
-      </dgm:prSet>
+    <dgm:pt modelId="{B4589FA7-CEFE-4C11-9645-295636E960AE}" type="pres">
+      <dgm:prSet presAssocID="{A905BB1F-32BA-4317-B1D7-55F01CB3DC42}" presName="parentTextBox" presStyleLbl="node1" presStyleIdx="0" presStyleCnt="3"/>
       <dgm:spPr/>
     </dgm:pt>
-    <dgm:pt modelId="{844CC9D4-E5EA-407C-A3B0-87CCB2D8137A}" type="pres">
-      <dgm:prSet presAssocID="{04B8BE75-06E6-46C1-9237-0B17B1DA8F24}" presName="ThreeNodes_2" presStyleLbl="node1" presStyleIdx="1" presStyleCnt="3">
-        <dgm:presLayoutVars>
-          <dgm:bulletEnabled val="1"/>
-        </dgm:presLayoutVars>
-      </dgm:prSet>
+    <dgm:pt modelId="{E67597A1-847D-4FCC-8557-74D076C0F53D}" type="pres">
+      <dgm:prSet presAssocID="{00F14550-F4CF-446F-B491-C92D2D65B94C}" presName="sp" presStyleCnt="0"/>
       <dgm:spPr/>
     </dgm:pt>
-    <dgm:pt modelId="{79C13493-9212-4B69-9EF3-EE5450533B6C}" type="pres">
-      <dgm:prSet presAssocID="{04B8BE75-06E6-46C1-9237-0B17B1DA8F24}" presName="ThreeNodes_3" presStyleLbl="node1" presStyleIdx="2" presStyleCnt="3" custLinFactNeighborX="19562" custLinFactNeighborY="40744">
-        <dgm:presLayoutVars>
-          <dgm:bulletEnabled val="1"/>
-        </dgm:presLayoutVars>
-      </dgm:prSet>
+    <dgm:pt modelId="{B8A78F02-CDD0-46A7-B5BC-30F85B69D6A0}" type="pres">
+      <dgm:prSet presAssocID="{620956CF-58BF-4748-AD24-5B5F07ABDF62}" presName="arrowAndChildren" presStyleCnt="0"/>
       <dgm:spPr/>
     </dgm:pt>
-    <dgm:pt modelId="{C28DDAFF-A518-4E4C-969F-0A3B4E84CC42}" type="pres">
-      <dgm:prSet presAssocID="{04B8BE75-06E6-46C1-9237-0B17B1DA8F24}" presName="ThreeConn_1-2" presStyleLbl="fgAccFollowNode1" presStyleIdx="0" presStyleCnt="2">
-        <dgm:presLayoutVars>
-          <dgm:bulletEnabled val="1"/>
-        </dgm:presLayoutVars>
-      </dgm:prSet>
+    <dgm:pt modelId="{BD3BF11E-91AB-4E55-8C8D-2404F082D640}" type="pres">
+      <dgm:prSet presAssocID="{620956CF-58BF-4748-AD24-5B5F07ABDF62}" presName="parentTextArrow" presStyleLbl="node1" presStyleIdx="1" presStyleCnt="3"/>
       <dgm:spPr/>
     </dgm:pt>
-    <dgm:pt modelId="{39140338-C46D-4D44-A157-07D193C45C14}" type="pres">
-      <dgm:prSet presAssocID="{04B8BE75-06E6-46C1-9237-0B17B1DA8F24}" presName="ThreeConn_2-3" presStyleLbl="fgAccFollowNode1" presStyleIdx="1" presStyleCnt="2">
-        <dgm:presLayoutVars>
-          <dgm:bulletEnabled val="1"/>
-        </dgm:presLayoutVars>
-      </dgm:prSet>
+    <dgm:pt modelId="{37A31726-9335-4EE3-9B05-4311F94ACB68}" type="pres">
+      <dgm:prSet presAssocID="{B964965F-099A-4E44-ACFC-30388FC6E177}" presName="sp" presStyleCnt="0"/>
       <dgm:spPr/>
     </dgm:pt>
-    <dgm:pt modelId="{197BF082-E6E8-4C4C-AF10-ECBF2D4094CF}" type="pres">
-      <dgm:prSet presAssocID="{04B8BE75-06E6-46C1-9237-0B17B1DA8F24}" presName="ThreeNodes_1_text" presStyleLbl="node1" presStyleIdx="2" presStyleCnt="3">
-        <dgm:presLayoutVars>
-          <dgm:bulletEnabled val="1"/>
-        </dgm:presLayoutVars>
-      </dgm:prSet>
+    <dgm:pt modelId="{E702D958-A736-404B-90BF-F9C693E806B9}" type="pres">
+      <dgm:prSet presAssocID="{A2D20A96-1431-4D92-87F9-71EC97A359A4}" presName="arrowAndChildren" presStyleCnt="0"/>
       <dgm:spPr/>
     </dgm:pt>
-    <dgm:pt modelId="{7F8B509C-08E8-45CD-BDBF-10FC00B86AEA}" type="pres">
-      <dgm:prSet presAssocID="{04B8BE75-06E6-46C1-9237-0B17B1DA8F24}" presName="ThreeNodes_2_text" presStyleLbl="node1" presStyleIdx="2" presStyleCnt="3">
-        <dgm:presLayoutVars>
-          <dgm:bulletEnabled val="1"/>
-        </dgm:presLayoutVars>
-      </dgm:prSet>
-      <dgm:spPr/>
-    </dgm:pt>
-    <dgm:pt modelId="{549E53AB-7FC9-4A67-A0A9-C8E0AE9893BE}" type="pres">
-      <dgm:prSet presAssocID="{04B8BE75-06E6-46C1-9237-0B17B1DA8F24}" presName="ThreeNodes_3_text" presStyleLbl="node1" presStyleIdx="2" presStyleCnt="3">
-        <dgm:presLayoutVars>
-          <dgm:bulletEnabled val="1"/>
-        </dgm:presLayoutVars>
-      </dgm:prSet>
+    <dgm:pt modelId="{A96FACCE-DB4E-43D9-AFD7-41A280BFD08C}" type="pres">
+      <dgm:prSet presAssocID="{A2D20A96-1431-4D92-87F9-71EC97A359A4}" presName="parentTextArrow" presStyleLbl="node1" presStyleIdx="2" presStyleCnt="3"/>
       <dgm:spPr/>
     </dgm:pt>
   </dgm:ptLst>
   <dgm:cxnLst>
-    <dgm:cxn modelId="{D0842117-4136-4B71-8D39-98019A1CB606}" type="presOf" srcId="{A2D20A96-1431-4D92-87F9-71EC97A359A4}" destId="{197BF082-E6E8-4C4C-AF10-ECBF2D4094CF}" srcOrd="1" destOrd="0" presId="urn:microsoft.com/office/officeart/2005/8/layout/vProcess5"/>
-    <dgm:cxn modelId="{AF743C20-CA62-46C1-8A78-7E778CCC41B7}" type="presOf" srcId="{A905BB1F-32BA-4317-B1D7-55F01CB3DC42}" destId="{79C13493-9212-4B69-9EF3-EE5450533B6C}" srcOrd="0" destOrd="0" presId="urn:microsoft.com/office/officeart/2005/8/layout/vProcess5"/>
     <dgm:cxn modelId="{B4BFB33A-DE5C-4829-AD63-90492B3C5459}" srcId="{04B8BE75-06E6-46C1-9237-0B17B1DA8F24}" destId="{A905BB1F-32BA-4317-B1D7-55F01CB3DC42}" srcOrd="2" destOrd="0" parTransId="{98DA5284-6B72-4F8C-A4A7-AC9C8311CFF8}" sibTransId="{C90D76EB-7CA6-47C2-B7D5-1494F9C7E3F7}"/>
-    <dgm:cxn modelId="{9E5E1E6B-1315-4962-A7A5-751360311FCA}" type="presOf" srcId="{A905BB1F-32BA-4317-B1D7-55F01CB3DC42}" destId="{549E53AB-7FC9-4A67-A0A9-C8E0AE9893BE}" srcOrd="1" destOrd="0" presId="urn:microsoft.com/office/officeart/2005/8/layout/vProcess5"/>
-    <dgm:cxn modelId="{A330DA7B-79F0-4C35-9DF2-A9BC67C2741F}" type="presOf" srcId="{04B8BE75-06E6-46C1-9237-0B17B1DA8F24}" destId="{10C74380-038D-4076-87B8-FAA5F8EB9261}" srcOrd="0" destOrd="0" presId="urn:microsoft.com/office/officeart/2005/8/layout/vProcess5"/>
-    <dgm:cxn modelId="{8F41747D-27B5-4AEE-BA77-7FF8A7B0BF22}" type="presOf" srcId="{A2D20A96-1431-4D92-87F9-71EC97A359A4}" destId="{31D0451B-0462-4FDC-9049-527E5A391790}" srcOrd="0" destOrd="0" presId="urn:microsoft.com/office/officeart/2005/8/layout/vProcess5"/>
-    <dgm:cxn modelId="{66431086-676D-4C5B-A369-F88B5A29C5D5}" type="presOf" srcId="{B964965F-099A-4E44-ACFC-30388FC6E177}" destId="{C28DDAFF-A518-4E4C-969F-0A3B4E84CC42}" srcOrd="0" destOrd="0" presId="urn:microsoft.com/office/officeart/2005/8/layout/vProcess5"/>
+    <dgm:cxn modelId="{A2B95F49-A154-467F-9240-0011CF88B113}" type="presOf" srcId="{A905BB1F-32BA-4317-B1D7-55F01CB3DC42}" destId="{B4589FA7-CEFE-4C11-9645-295636E960AE}" srcOrd="0" destOrd="0" presId="urn:microsoft.com/office/officeart/2005/8/layout/process4"/>
+    <dgm:cxn modelId="{E21EAA89-FA9D-4BF5-8BBA-85DBF97E69F9}" type="presOf" srcId="{04B8BE75-06E6-46C1-9237-0B17B1DA8F24}" destId="{6222796C-289A-43BE-90FA-15C2A0DE6642}" srcOrd="0" destOrd="0" presId="urn:microsoft.com/office/officeart/2005/8/layout/process4"/>
     <dgm:cxn modelId="{C15E0C95-028F-4C5B-9EF7-F7217F5604E8}" srcId="{04B8BE75-06E6-46C1-9237-0B17B1DA8F24}" destId="{A2D20A96-1431-4D92-87F9-71EC97A359A4}" srcOrd="0" destOrd="0" parTransId="{AC96FB75-120B-4437-97B4-AE89CF3023D3}" sibTransId="{B964965F-099A-4E44-ACFC-30388FC6E177}"/>
-    <dgm:cxn modelId="{EBFA46AE-BCEC-43F5-979A-995A15DD386A}" type="presOf" srcId="{620956CF-58BF-4748-AD24-5B5F07ABDF62}" destId="{844CC9D4-E5EA-407C-A3B0-87CCB2D8137A}" srcOrd="0" destOrd="0" presId="urn:microsoft.com/office/officeart/2005/8/layout/vProcess5"/>
-    <dgm:cxn modelId="{585762C2-FB6B-48E6-8CD4-5F802396DAAF}" type="presOf" srcId="{620956CF-58BF-4748-AD24-5B5F07ABDF62}" destId="{7F8B509C-08E8-45CD-BDBF-10FC00B86AEA}" srcOrd="1" destOrd="0" presId="urn:microsoft.com/office/officeart/2005/8/layout/vProcess5"/>
-    <dgm:cxn modelId="{04F5D1CA-EFDA-48E2-958B-D9D5803B1BEF}" type="presOf" srcId="{00F14550-F4CF-446F-B491-C92D2D65B94C}" destId="{39140338-C46D-4D44-A157-07D193C45C14}" srcOrd="0" destOrd="0" presId="urn:microsoft.com/office/officeart/2005/8/layout/vProcess5"/>
+    <dgm:cxn modelId="{362EB6A9-B486-48BE-93E2-B8E6E721920A}" type="presOf" srcId="{A2D20A96-1431-4D92-87F9-71EC97A359A4}" destId="{A96FACCE-DB4E-43D9-AFD7-41A280BFD08C}" srcOrd="0" destOrd="0" presId="urn:microsoft.com/office/officeart/2005/8/layout/process4"/>
+    <dgm:cxn modelId="{CDA070E6-6706-496B-952F-6632A05FCFFE}" type="presOf" srcId="{620956CF-58BF-4748-AD24-5B5F07ABDF62}" destId="{BD3BF11E-91AB-4E55-8C8D-2404F082D640}" srcOrd="0" destOrd="0" presId="urn:microsoft.com/office/officeart/2005/8/layout/process4"/>
     <dgm:cxn modelId="{B8BA6EF5-BBBF-4F14-8405-C6D78BDC37D4}" srcId="{04B8BE75-06E6-46C1-9237-0B17B1DA8F24}" destId="{620956CF-58BF-4748-AD24-5B5F07ABDF62}" srcOrd="1" destOrd="0" parTransId="{F34D9458-486F-4A74-879A-8D9C171478FE}" sibTransId="{00F14550-F4CF-446F-B491-C92D2D65B94C}"/>
-    <dgm:cxn modelId="{2A5DF79F-2DFE-4D95-A7A0-55D883E38B0B}" type="presParOf" srcId="{10C74380-038D-4076-87B8-FAA5F8EB9261}" destId="{F574FEFA-9519-46C8-BCB9-1773EC3A357C}" srcOrd="0" destOrd="0" presId="urn:microsoft.com/office/officeart/2005/8/layout/vProcess5"/>
-    <dgm:cxn modelId="{B56ED65C-90C7-4304-96BC-F4EC01581190}" type="presParOf" srcId="{10C74380-038D-4076-87B8-FAA5F8EB9261}" destId="{31D0451B-0462-4FDC-9049-527E5A391790}" srcOrd="1" destOrd="0" presId="urn:microsoft.com/office/officeart/2005/8/layout/vProcess5"/>
-    <dgm:cxn modelId="{6FB37D47-B38D-4544-A213-7DCB5FBFFDCB}" type="presParOf" srcId="{10C74380-038D-4076-87B8-FAA5F8EB9261}" destId="{844CC9D4-E5EA-407C-A3B0-87CCB2D8137A}" srcOrd="2" destOrd="0" presId="urn:microsoft.com/office/officeart/2005/8/layout/vProcess5"/>
-    <dgm:cxn modelId="{46CA5DC4-DA45-43EC-90E2-42DB85B3AC1B}" type="presParOf" srcId="{10C74380-038D-4076-87B8-FAA5F8EB9261}" destId="{79C13493-9212-4B69-9EF3-EE5450533B6C}" srcOrd="3" destOrd="0" presId="urn:microsoft.com/office/officeart/2005/8/layout/vProcess5"/>
-    <dgm:cxn modelId="{80D6641A-0B22-447A-A687-28BBABD977D5}" type="presParOf" srcId="{10C74380-038D-4076-87B8-FAA5F8EB9261}" destId="{C28DDAFF-A518-4E4C-969F-0A3B4E84CC42}" srcOrd="4" destOrd="0" presId="urn:microsoft.com/office/officeart/2005/8/layout/vProcess5"/>
-    <dgm:cxn modelId="{F317BBC9-C309-44D9-AAFD-D87F5427E078}" type="presParOf" srcId="{10C74380-038D-4076-87B8-FAA5F8EB9261}" destId="{39140338-C46D-4D44-A157-07D193C45C14}" srcOrd="5" destOrd="0" presId="urn:microsoft.com/office/officeart/2005/8/layout/vProcess5"/>
-    <dgm:cxn modelId="{69E69D7F-BB79-4722-92CF-D75B51BB7CF0}" type="presParOf" srcId="{10C74380-038D-4076-87B8-FAA5F8EB9261}" destId="{197BF082-E6E8-4C4C-AF10-ECBF2D4094CF}" srcOrd="6" destOrd="0" presId="urn:microsoft.com/office/officeart/2005/8/layout/vProcess5"/>
-    <dgm:cxn modelId="{BBFEEDBB-B3AD-45BC-B200-E02005A63146}" type="presParOf" srcId="{10C74380-038D-4076-87B8-FAA5F8EB9261}" destId="{7F8B509C-08E8-45CD-BDBF-10FC00B86AEA}" srcOrd="7" destOrd="0" presId="urn:microsoft.com/office/officeart/2005/8/layout/vProcess5"/>
-    <dgm:cxn modelId="{1E901345-14D0-47D1-86ED-E654257619FE}" type="presParOf" srcId="{10C74380-038D-4076-87B8-FAA5F8EB9261}" destId="{549E53AB-7FC9-4A67-A0A9-C8E0AE9893BE}" srcOrd="8" destOrd="0" presId="urn:microsoft.com/office/officeart/2005/8/layout/vProcess5"/>
+    <dgm:cxn modelId="{3CD5D7D9-474E-4739-A381-D154BE8F4DA6}" type="presParOf" srcId="{6222796C-289A-43BE-90FA-15C2A0DE6642}" destId="{B4F34417-8930-4675-B1CA-26C25EB7C749}" srcOrd="0" destOrd="0" presId="urn:microsoft.com/office/officeart/2005/8/layout/process4"/>
+    <dgm:cxn modelId="{DF50DF3B-D74E-46C4-A93F-86087A347524}" type="presParOf" srcId="{B4F34417-8930-4675-B1CA-26C25EB7C749}" destId="{B4589FA7-CEFE-4C11-9645-295636E960AE}" srcOrd="0" destOrd="0" presId="urn:microsoft.com/office/officeart/2005/8/layout/process4"/>
+    <dgm:cxn modelId="{B459E0A7-7B65-444D-ABD2-CFD1460356F1}" type="presParOf" srcId="{6222796C-289A-43BE-90FA-15C2A0DE6642}" destId="{E67597A1-847D-4FCC-8557-74D076C0F53D}" srcOrd="1" destOrd="0" presId="urn:microsoft.com/office/officeart/2005/8/layout/process4"/>
+    <dgm:cxn modelId="{51E9C1CA-9BF8-4FBF-9C23-25E2A71796D6}" type="presParOf" srcId="{6222796C-289A-43BE-90FA-15C2A0DE6642}" destId="{B8A78F02-CDD0-46A7-B5BC-30F85B69D6A0}" srcOrd="2" destOrd="0" presId="urn:microsoft.com/office/officeart/2005/8/layout/process4"/>
+    <dgm:cxn modelId="{588E2A13-6087-4BA4-86E2-A3AE00B0D4B7}" type="presParOf" srcId="{B8A78F02-CDD0-46A7-B5BC-30F85B69D6A0}" destId="{BD3BF11E-91AB-4E55-8C8D-2404F082D640}" srcOrd="0" destOrd="0" presId="urn:microsoft.com/office/officeart/2005/8/layout/process4"/>
+    <dgm:cxn modelId="{9FFBEC9A-BD7D-47BF-AA0A-265E0522F7B4}" type="presParOf" srcId="{6222796C-289A-43BE-90FA-15C2A0DE6642}" destId="{37A31726-9335-4EE3-9B05-4311F94ACB68}" srcOrd="3" destOrd="0" presId="urn:microsoft.com/office/officeart/2005/8/layout/process4"/>
+    <dgm:cxn modelId="{2EC77BFE-3F01-4BAE-8F10-BCDF5C4DE67F}" type="presParOf" srcId="{6222796C-289A-43BE-90FA-15C2A0DE6642}" destId="{E702D958-A736-404B-90BF-F9C693E806B9}" srcOrd="4" destOrd="0" presId="urn:microsoft.com/office/officeart/2005/8/layout/process4"/>
+    <dgm:cxn modelId="{1DDA21DE-422F-4864-9937-3D82D9AE732A}" type="presParOf" srcId="{E702D958-A736-404B-90BF-F9C693E806B9}" destId="{A96FACCE-DB4E-43D9-AFD7-41A280BFD08C}" srcOrd="0" destOrd="0" presId="urn:microsoft.com/office/officeart/2005/8/layout/process4"/>
   </dgm:cxnLst>
   <dgm:bg/>
   <dgm:whole/>
@@ -1170,20 +1140,18 @@
       <dsp:cNvGrpSpPr/>
     </dsp:nvGrpSpPr>
     <dsp:grpSpPr/>
-    <dsp:sp modelId="{31D0451B-0462-4FDC-9049-527E5A391790}">
+    <dsp:sp modelId="{B4589FA7-CEFE-4C11-9645-295636E960AE}">
       <dsp:nvSpPr>
         <dsp:cNvPr id="0" name=""/>
         <dsp:cNvSpPr/>
       </dsp:nvSpPr>
       <dsp:spPr>
         <a:xfrm>
-          <a:off x="0" y="0"/>
-          <a:ext cx="6910081" cy="878187"/>
+          <a:off x="0" y="2203528"/>
+          <a:ext cx="8129508" cy="723247"/>
         </a:xfrm>
-        <a:prstGeom prst="roundRect">
-          <a:avLst>
-            <a:gd name="adj" fmla="val 10000"/>
-          </a:avLst>
+        <a:prstGeom prst="rect">
+          <a:avLst/>
         </a:prstGeom>
         <a:solidFill>
           <a:schemeClr val="lt1">
@@ -1225,12 +1193,12 @@
         </a:fontRef>
       </dsp:style>
       <dsp:txBody>
-        <a:bodyPr spcFirstLastPara="0" vert="horz" wrap="square" lIns="91440" tIns="91440" rIns="91440" bIns="91440" numCol="1" spcCol="1270" anchor="ctr" anchorCtr="0">
+        <a:bodyPr spcFirstLastPara="0" vert="horz" wrap="square" lIns="184912" tIns="184912" rIns="184912" bIns="184912" numCol="1" spcCol="1270" anchor="ctr" anchorCtr="0">
           <a:noAutofit/>
         </a:bodyPr>
         <a:lstStyle/>
         <a:p>
-          <a:pPr marL="0" lvl="0" indent="0" algn="l" defTabSz="1066800">
+          <a:pPr marL="0" lvl="0" indent="0" algn="ctr" defTabSz="1155700">
             <a:lnSpc>
               <a:spcPct val="90000"/>
             </a:lnSpc>
@@ -1243,30 +1211,28 @@
             <a:buNone/>
           </a:pPr>
           <a:r>
-            <a:rPr lang="en-US" sz="2400" kern="1200" dirty="0"/>
-            <a:t>What genres have the strongest correlation with ROI?</a:t>
+            <a:rPr lang="en-US" sz="2600" kern="1200" dirty="0"/>
+            <a:t>Are high or low-budget films more profitable?</a:t>
           </a:r>
         </a:p>
       </dsp:txBody>
       <dsp:txXfrm>
-        <a:off x="25721" y="25721"/>
-        <a:ext cx="5962449" cy="826745"/>
+        <a:off x="0" y="2203528"/>
+        <a:ext cx="8129508" cy="723247"/>
       </dsp:txXfrm>
     </dsp:sp>
-    <dsp:sp modelId="{844CC9D4-E5EA-407C-A3B0-87CCB2D8137A}">
+    <dsp:sp modelId="{BD3BF11E-91AB-4E55-8C8D-2404F082D640}">
       <dsp:nvSpPr>
         <dsp:cNvPr id="0" name=""/>
         <dsp:cNvSpPr/>
       </dsp:nvSpPr>
       <dsp:spPr>
-        <a:xfrm>
-          <a:off x="609713" y="1024552"/>
-          <a:ext cx="6910081" cy="878187"/>
+        <a:xfrm rot="10800000">
+          <a:off x="0" y="1102022"/>
+          <a:ext cx="8129508" cy="1112354"/>
         </a:xfrm>
-        <a:prstGeom prst="roundRect">
-          <a:avLst>
-            <a:gd name="adj" fmla="val 10000"/>
-          </a:avLst>
+        <a:prstGeom prst="upArrowCallout">
+          <a:avLst/>
         </a:prstGeom>
         <a:solidFill>
           <a:schemeClr val="lt1">
@@ -1308,12 +1274,12 @@
         </a:fontRef>
       </dsp:style>
       <dsp:txBody>
-        <a:bodyPr spcFirstLastPara="0" vert="horz" wrap="square" lIns="91440" tIns="91440" rIns="91440" bIns="91440" numCol="1" spcCol="1270" anchor="ctr" anchorCtr="0">
+        <a:bodyPr spcFirstLastPara="0" vert="horz" wrap="square" lIns="184912" tIns="184912" rIns="184912" bIns="184912" numCol="1" spcCol="1270" anchor="ctr" anchorCtr="0">
           <a:noAutofit/>
         </a:bodyPr>
         <a:lstStyle/>
         <a:p>
-          <a:pPr marL="0" lvl="0" indent="0" algn="l" defTabSz="1066800">
+          <a:pPr marL="0" lvl="0" indent="0" algn="ctr" defTabSz="1155700">
             <a:lnSpc>
               <a:spcPct val="90000"/>
             </a:lnSpc>
@@ -1326,30 +1292,28 @@
             <a:buNone/>
           </a:pPr>
           <a:r>
-            <a:rPr lang="en-US" sz="2400" kern="1200"/>
+            <a:rPr lang="en-US" sz="2600" kern="1200" dirty="0"/>
             <a:t>How does budget affect these correlations?</a:t>
           </a:r>
         </a:p>
       </dsp:txBody>
-      <dsp:txXfrm>
-        <a:off x="635434" y="1050273"/>
-        <a:ext cx="5678104" cy="826745"/>
+      <dsp:txXfrm rot="10800000">
+        <a:off x="0" y="1102022"/>
+        <a:ext cx="8129508" cy="722774"/>
       </dsp:txXfrm>
     </dsp:sp>
-    <dsp:sp modelId="{79C13493-9212-4B69-9EF3-EE5450533B6C}">
+    <dsp:sp modelId="{A96FACCE-DB4E-43D9-AFD7-41A280BFD08C}">
       <dsp:nvSpPr>
         <dsp:cNvPr id="0" name=""/>
         <dsp:cNvSpPr/>
       </dsp:nvSpPr>
       <dsp:spPr>
-        <a:xfrm>
-          <a:off x="1219426" y="2049105"/>
-          <a:ext cx="6910081" cy="878187"/>
+        <a:xfrm rot="10800000">
+          <a:off x="0" y="517"/>
+          <a:ext cx="8129508" cy="1112354"/>
         </a:xfrm>
-        <a:prstGeom prst="roundRect">
-          <a:avLst>
-            <a:gd name="adj" fmla="val 10000"/>
-          </a:avLst>
+        <a:prstGeom prst="upArrowCallout">
+          <a:avLst/>
         </a:prstGeom>
         <a:solidFill>
           <a:schemeClr val="lt1">
@@ -1391,12 +1355,12 @@
         </a:fontRef>
       </dsp:style>
       <dsp:txBody>
-        <a:bodyPr spcFirstLastPara="0" vert="horz" wrap="square" lIns="91440" tIns="91440" rIns="91440" bIns="91440" numCol="1" spcCol="1270" anchor="ctr" anchorCtr="0">
+        <a:bodyPr spcFirstLastPara="0" vert="horz" wrap="square" lIns="184912" tIns="184912" rIns="184912" bIns="184912" numCol="1" spcCol="1270" anchor="ctr" anchorCtr="0">
           <a:noAutofit/>
         </a:bodyPr>
         <a:lstStyle/>
         <a:p>
-          <a:pPr marL="0" lvl="0" indent="0" algn="l" defTabSz="1066800">
+          <a:pPr marL="0" lvl="0" indent="0" algn="ctr" defTabSz="1155700">
             <a:lnSpc>
               <a:spcPct val="90000"/>
             </a:lnSpc>
@@ -1409,176 +1373,26 @@
             <a:buNone/>
           </a:pPr>
           <a:r>
-            <a:rPr lang="en-US" sz="2400" kern="1200"/>
-            <a:t>Are high or low-budget films more profitable?</a:t>
+            <a:rPr lang="en-US" sz="2600" kern="1200" dirty="0"/>
+            <a:t>What </a:t>
+          </a:r>
+          <a:r>
+            <a:rPr lang="en-US" sz="2600" kern="1200" dirty="0">
+              <a:solidFill>
+                <a:schemeClr val="tx1"/>
+              </a:solidFill>
+            </a:rPr>
+            <a:t>genres</a:t>
+          </a:r>
+          <a:r>
+            <a:rPr lang="en-US" sz="2600" kern="1200" dirty="0"/>
+            <a:t> have the strongest correlation with ROI?</a:t>
           </a:r>
         </a:p>
       </dsp:txBody>
-      <dsp:txXfrm>
-        <a:off x="1245147" y="2074826"/>
-        <a:ext cx="5678104" cy="826745"/>
-      </dsp:txXfrm>
-    </dsp:sp>
-    <dsp:sp modelId="{C28DDAFF-A518-4E4C-969F-0A3B4E84CC42}">
-      <dsp:nvSpPr>
-        <dsp:cNvPr id="0" name=""/>
-        <dsp:cNvSpPr/>
-      </dsp:nvSpPr>
-      <dsp:spPr>
-        <a:xfrm>
-          <a:off x="6339259" y="665959"/>
-          <a:ext cx="570822" cy="570822"/>
-        </a:xfrm>
-        <a:prstGeom prst="downArrow">
-          <a:avLst>
-            <a:gd name="adj1" fmla="val 55000"/>
-            <a:gd name="adj2" fmla="val 45000"/>
-          </a:avLst>
-        </a:prstGeom>
-        <a:solidFill>
-          <a:schemeClr val="lt1">
-            <a:alpha val="90000"/>
-            <a:tint val="40000"/>
-            <a:hueOff val="0"/>
-            <a:satOff val="0"/>
-            <a:lumOff val="0"/>
-            <a:alphaOff val="0"/>
-          </a:schemeClr>
-        </a:solidFill>
-        <a:ln>
-          <a:noFill/>
-        </a:ln>
-        <a:effectLst/>
-        <a:scene3d>
-          <a:camera prst="orthographicFront">
-            <a:rot lat="0" lon="0" rev="0"/>
-          </a:camera>
-          <a:lightRig rig="contrasting" dir="t">
-            <a:rot lat="0" lon="0" rev="1200000"/>
-          </a:lightRig>
-        </a:scene3d>
-        <a:sp3d z="300000" contourW="19050" prstMaterial="metal">
-          <a:bevelT w="88900" h="203200"/>
-          <a:bevelB w="165100" h="254000"/>
-        </a:sp3d>
-      </dsp:spPr>
-      <dsp:style>
-        <a:lnRef idx="0">
-          <a:scrgbClr r="0" g="0" b="0"/>
-        </a:lnRef>
-        <a:fillRef idx="1">
-          <a:scrgbClr r="0" g="0" b="0"/>
-        </a:fillRef>
-        <a:effectRef idx="0">
-          <a:scrgbClr r="0" g="0" b="0"/>
-        </a:effectRef>
-        <a:fontRef idx="minor"/>
-      </dsp:style>
-      <dsp:txBody>
-        <a:bodyPr spcFirstLastPara="0" vert="horz" wrap="square" lIns="34290" tIns="34290" rIns="34290" bIns="34290" numCol="1" spcCol="1270" anchor="ctr" anchorCtr="0">
-          <a:noAutofit/>
-        </a:bodyPr>
-        <a:lstStyle/>
-        <a:p>
-          <a:pPr marL="0" lvl="0" indent="0" algn="ctr" defTabSz="1200150">
-            <a:lnSpc>
-              <a:spcPct val="90000"/>
-            </a:lnSpc>
-            <a:spcBef>
-              <a:spcPct val="0"/>
-            </a:spcBef>
-            <a:spcAft>
-              <a:spcPct val="35000"/>
-            </a:spcAft>
-            <a:buNone/>
-          </a:pPr>
-          <a:endParaRPr lang="en-US" sz="2700" kern="1200"/>
-        </a:p>
-      </dsp:txBody>
-      <dsp:txXfrm>
-        <a:off x="6467694" y="665959"/>
-        <a:ext cx="313952" cy="429544"/>
-      </dsp:txXfrm>
-    </dsp:sp>
-    <dsp:sp modelId="{39140338-C46D-4D44-A157-07D193C45C14}">
-      <dsp:nvSpPr>
-        <dsp:cNvPr id="0" name=""/>
-        <dsp:cNvSpPr/>
-      </dsp:nvSpPr>
-      <dsp:spPr>
-        <a:xfrm>
-          <a:off x="6948972" y="1684657"/>
-          <a:ext cx="570822" cy="570822"/>
-        </a:xfrm>
-        <a:prstGeom prst="downArrow">
-          <a:avLst>
-            <a:gd name="adj1" fmla="val 55000"/>
-            <a:gd name="adj2" fmla="val 45000"/>
-          </a:avLst>
-        </a:prstGeom>
-        <a:solidFill>
-          <a:schemeClr val="lt1">
-            <a:alpha val="90000"/>
-            <a:tint val="40000"/>
-            <a:hueOff val="0"/>
-            <a:satOff val="0"/>
-            <a:lumOff val="0"/>
-            <a:alphaOff val="0"/>
-          </a:schemeClr>
-        </a:solidFill>
-        <a:ln>
-          <a:noFill/>
-        </a:ln>
-        <a:effectLst/>
-        <a:scene3d>
-          <a:camera prst="orthographicFront">
-            <a:rot lat="0" lon="0" rev="0"/>
-          </a:camera>
-          <a:lightRig rig="contrasting" dir="t">
-            <a:rot lat="0" lon="0" rev="1200000"/>
-          </a:lightRig>
-        </a:scene3d>
-        <a:sp3d z="300000" contourW="19050" prstMaterial="metal">
-          <a:bevelT w="88900" h="203200"/>
-          <a:bevelB w="165100" h="254000"/>
-        </a:sp3d>
-      </dsp:spPr>
-      <dsp:style>
-        <a:lnRef idx="0">
-          <a:scrgbClr r="0" g="0" b="0"/>
-        </a:lnRef>
-        <a:fillRef idx="1">
-          <a:scrgbClr r="0" g="0" b="0"/>
-        </a:fillRef>
-        <a:effectRef idx="0">
-          <a:scrgbClr r="0" g="0" b="0"/>
-        </a:effectRef>
-        <a:fontRef idx="minor"/>
-      </dsp:style>
-      <dsp:txBody>
-        <a:bodyPr spcFirstLastPara="0" vert="horz" wrap="square" lIns="34290" tIns="34290" rIns="34290" bIns="34290" numCol="1" spcCol="1270" anchor="ctr" anchorCtr="0">
-          <a:noAutofit/>
-        </a:bodyPr>
-        <a:lstStyle/>
-        <a:p>
-          <a:pPr marL="0" lvl="0" indent="0" algn="ctr" defTabSz="1200150">
-            <a:lnSpc>
-              <a:spcPct val="90000"/>
-            </a:lnSpc>
-            <a:spcBef>
-              <a:spcPct val="0"/>
-            </a:spcBef>
-            <a:spcAft>
-              <a:spcPct val="35000"/>
-            </a:spcAft>
-            <a:buNone/>
-          </a:pPr>
-          <a:endParaRPr lang="en-US" sz="2700" kern="1200"/>
-        </a:p>
-      </dsp:txBody>
-      <dsp:txXfrm>
-        <a:off x="7077407" y="1684657"/>
-        <a:ext cx="313952" cy="429544"/>
+      <dsp:txXfrm rot="10800000">
+        <a:off x="0" y="517"/>
+        <a:ext cx="8129508" cy="722774"/>
       </dsp:txXfrm>
     </dsp:sp>
   </dsp:spTree>
@@ -1586,11 +1400,12 @@
 </file>
 
 <file path=ppt/diagrams/layout1.xml><?xml version="1.0" encoding="utf-8"?>
-<dgm:layoutDef xmlns:dgm="http://schemas.openxmlformats.org/drawingml/2006/diagram" xmlns:a="http://schemas.openxmlformats.org/drawingml/2006/main" uniqueId="urn:microsoft.com/office/officeart/2005/8/layout/vProcess5">
+<dgm:layoutDef xmlns:dgm="http://schemas.openxmlformats.org/drawingml/2006/diagram" xmlns:a="http://schemas.openxmlformats.org/drawingml/2006/main" uniqueId="urn:microsoft.com/office/officeart/2005/8/layout/process4">
   <dgm:title val=""/>
   <dgm:desc val=""/>
   <dgm:catLst>
-    <dgm:cat type="process" pri="14000"/>
+    <dgm:cat type="process" pri="16000"/>
+    <dgm:cat type="list" pri="20000"/>
   </dgm:catLst>
   <dgm:sampData>
     <dgm:dataModel>
@@ -1599,17 +1414,41 @@
         <dgm:pt modelId="1">
           <dgm:prSet phldr="1"/>
         </dgm:pt>
+        <dgm:pt modelId="11">
+          <dgm:prSet phldr="1"/>
+        </dgm:pt>
+        <dgm:pt modelId="12">
+          <dgm:prSet phldr="1"/>
+        </dgm:pt>
         <dgm:pt modelId="2">
+          <dgm:prSet phldr="1"/>
+        </dgm:pt>
+        <dgm:pt modelId="21">
+          <dgm:prSet phldr="1"/>
+        </dgm:pt>
+        <dgm:pt modelId="22">
           <dgm:prSet phldr="1"/>
         </dgm:pt>
         <dgm:pt modelId="3">
           <dgm:prSet phldr="1"/>
         </dgm:pt>
+        <dgm:pt modelId="31">
+          <dgm:prSet phldr="1"/>
+        </dgm:pt>
+        <dgm:pt modelId="32">
+          <dgm:prSet phldr="1"/>
+        </dgm:pt>
       </dgm:ptLst>
       <dgm:cxnLst>
-        <dgm:cxn modelId="5" srcId="0" destId="1" srcOrd="0" destOrd="0"/>
-        <dgm:cxn modelId="6" srcId="0" destId="2" srcOrd="1" destOrd="0"/>
-        <dgm:cxn modelId="7" srcId="0" destId="3" srcOrd="2" destOrd="0"/>
+        <dgm:cxn modelId="4" srcId="0" destId="1" srcOrd="0" destOrd="0"/>
+        <dgm:cxn modelId="5" srcId="0" destId="2" srcOrd="1" destOrd="0"/>
+        <dgm:cxn modelId="6" srcId="0" destId="3" srcOrd="2" destOrd="0"/>
+        <dgm:cxn modelId="13" srcId="1" destId="11" srcOrd="0" destOrd="0"/>
+        <dgm:cxn modelId="14" srcId="1" destId="12" srcOrd="1" destOrd="0"/>
+        <dgm:cxn modelId="23" srcId="2" destId="21" srcOrd="0" destOrd="0"/>
+        <dgm:cxn modelId="24" srcId="2" destId="22" srcOrd="1" destOrd="0"/>
+        <dgm:cxn modelId="33" srcId="3" destId="31" srcOrd="0" destOrd="0"/>
+        <dgm:cxn modelId="34" srcId="3" destId="32" srcOrd="1" destOrd="0"/>
       </dgm:cxnLst>
       <dgm:bg/>
       <dgm:whole/>
@@ -1620,11 +1459,15 @@
       <dgm:ptLst>
         <dgm:pt modelId="0" type="doc"/>
         <dgm:pt modelId="1"/>
+        <dgm:pt modelId="11"/>
         <dgm:pt modelId="2"/>
+        <dgm:pt modelId="21"/>
       </dgm:ptLst>
       <dgm:cxnLst>
-        <dgm:cxn modelId="3" srcId="0" destId="1" srcOrd="0" destOrd="0"/>
-        <dgm:cxn modelId="4" srcId="0" destId="2" srcOrd="1" destOrd="0"/>
+        <dgm:cxn modelId="4" srcId="0" destId="1" srcOrd="0" destOrd="0"/>
+        <dgm:cxn modelId="5" srcId="0" destId="2" srcOrd="1" destOrd="0"/>
+        <dgm:cxn modelId="13" srcId="1" destId="11" srcOrd="0" destOrd="0"/>
+        <dgm:cxn modelId="23" srcId="2" destId="21" srcOrd="0" destOrd="0"/>
       </dgm:cxnLst>
       <dgm:bg/>
       <dgm:whole/>
@@ -1635,738 +1478,145 @@
       <dgm:ptLst>
         <dgm:pt modelId="0" type="doc"/>
         <dgm:pt modelId="1"/>
+        <dgm:pt modelId="11"/>
         <dgm:pt modelId="2"/>
+        <dgm:pt modelId="21"/>
         <dgm:pt modelId="3"/>
+        <dgm:pt modelId="31"/>
         <dgm:pt modelId="4"/>
+        <dgm:pt modelId="41"/>
       </dgm:ptLst>
       <dgm:cxnLst>
-        <dgm:cxn modelId="6" srcId="0" destId="1" srcOrd="0" destOrd="0"/>
-        <dgm:cxn modelId="7" srcId="0" destId="2" srcOrd="1" destOrd="0"/>
-        <dgm:cxn modelId="8" srcId="0" destId="3" srcOrd="2" destOrd="0"/>
-        <dgm:cxn modelId="9" srcId="0" destId="4" srcOrd="3" destOrd="0"/>
+        <dgm:cxn modelId="5" srcId="0" destId="1" srcOrd="0" destOrd="0"/>
+        <dgm:cxn modelId="6" srcId="0" destId="2" srcOrd="1" destOrd="0"/>
+        <dgm:cxn modelId="7" srcId="0" destId="3" srcOrd="2" destOrd="0"/>
+        <dgm:cxn modelId="8" srcId="0" destId="4" srcOrd="3" destOrd="0"/>
+        <dgm:cxn modelId="13" srcId="1" destId="11" srcOrd="0" destOrd="0"/>
+        <dgm:cxn modelId="23" srcId="2" destId="21" srcOrd="0" destOrd="0"/>
+        <dgm:cxn modelId="33" srcId="3" destId="31" srcOrd="0" destOrd="0"/>
+        <dgm:cxn modelId="43" srcId="4" destId="41" srcOrd="0" destOrd="0"/>
       </dgm:cxnLst>
       <dgm:bg/>
       <dgm:whole/>
     </dgm:dataModel>
   </dgm:clrData>
-  <dgm:layoutNode name="outerComposite">
+  <dgm:layoutNode name="Name0">
     <dgm:varLst>
-      <dgm:chMax val="5"/>
       <dgm:dir/>
+      <dgm:animLvl val="lvl"/>
       <dgm:resizeHandles val="exact"/>
     </dgm:varLst>
-    <dgm:alg type="composite"/>
+    <dgm:alg type="lin">
+      <dgm:param type="linDir" val="fromB"/>
+    </dgm:alg>
     <dgm:shape xmlns:r="http://schemas.openxmlformats.org/officeDocument/2006/relationships" r:blip="">
       <dgm:adjLst/>
     </dgm:shape>
     <dgm:presOf/>
-    <dgm:choose name="Name0">
-      <dgm:if name="Name1" func="var" arg="dir" op="equ" val="norm">
-        <dgm:constrLst>
-          <dgm:constr type="primFontSz" for="ch" ptType="node" op="equ" val="65"/>
-          <dgm:constr type="w" for="ch" forName="dummyMaxCanvas" refType="w"/>
-          <dgm:constr type="h" for="ch" forName="dummyMaxCanvas" refType="h"/>
-          <dgm:constr type="w" for="ch" forName="OneNode_1" refType="w"/>
-          <dgm:constr type="h" for="ch" forName="OneNode_1" refType="h" fact="0.5"/>
-          <dgm:constr type="ctrY" for="ch" forName="OneNode_1" refType="h" fact="0.5"/>
-          <dgm:constr type="w" for="ch" forName="TwoNodes_1" refType="w" fact="0.85"/>
-          <dgm:constr type="h" for="ch" forName="TwoNodes_1" refType="h" fact="0.45"/>
-          <dgm:constr type="t" for="ch" forName="TwoNodes_1"/>
-          <dgm:constr type="l" for="ch" forName="TwoNodes_1"/>
-          <dgm:constr type="w" for="ch" forName="TwoNodes_2" refType="w" fact="0.85"/>
-          <dgm:constr type="h" for="ch" forName="TwoNodes_2" refType="h" fact="0.45"/>
-          <dgm:constr type="b" for="ch" forName="TwoNodes_2" refType="h"/>
-          <dgm:constr type="r" for="ch" forName="TwoNodes_2" refType="w"/>
-          <dgm:constr type="w" for="ch" forName="TwoConn_1-2" refType="h" refFor="ch" refForName="TwoNodes_1" fact="0.65"/>
-          <dgm:constr type="h" for="ch" forName="TwoConn_1-2" refType="h" refFor="ch" refForName="TwoNodes_1" fact="0.65"/>
-          <dgm:constr type="ctrY" for="ch" forName="TwoConn_1-2" refType="h" fact="0.5"/>
-          <dgm:constr type="r" for="ch" forName="TwoConn_1-2" refType="r" refFor="ch" refForName="TwoNodes_1"/>
-          <dgm:constr type="r" for="ch" forName="TwoNodes_1_text" refType="l" refFor="ch" refForName="TwoConn_1-2"/>
-          <dgm:constr type="rOff" for="ch" forName="TwoNodes_1_text" refType="w" refFor="ch" refForName="TwoConn_1-2" fact="-0.5"/>
-          <dgm:constr type="t" for="ch" forName="TwoNodes_1_text" refType="t" refFor="ch" refForName="TwoNodes_1"/>
-          <dgm:constr type="b" for="ch" forName="TwoNodes_1_text" refType="b" refFor="ch" refForName="TwoNodes_1"/>
-          <dgm:constr type="l" for="ch" forName="TwoNodes_1_text" refType="l" refFor="ch" refForName="TwoNodes_1"/>
-          <dgm:constr type="r" for="ch" forName="TwoNodes_2_text" refType="l" refFor="ch" refForName="TwoConn_1-2"/>
-          <dgm:constr type="t" for="ch" forName="TwoNodes_2_text" refType="t" refFor="ch" refForName="TwoNodes_2"/>
-          <dgm:constr type="b" for="ch" forName="TwoNodes_2_text" refType="b" refFor="ch" refForName="TwoNodes_2"/>
-          <dgm:constr type="l" for="ch" forName="TwoNodes_2_text" refType="l" refFor="ch" refForName="TwoNodes_2"/>
-          <dgm:constr type="w" for="ch" forName="ThreeNodes_1" refType="w" fact="0.85"/>
-          <dgm:constr type="h" for="ch" forName="ThreeNodes_1" refType="h" fact="0.3"/>
-          <dgm:constr type="t" for="ch" forName="ThreeNodes_1"/>
-          <dgm:constr type="l" for="ch" forName="ThreeNodes_1"/>
-          <dgm:constr type="w" for="ch" forName="ThreeNodes_2" refType="w" fact="0.85"/>
-          <dgm:constr type="h" for="ch" forName="ThreeNodes_2" refType="h" fact="0.3"/>
-          <dgm:constr type="ctrY" for="ch" forName="ThreeNodes_2" refType="h" fact="0.5"/>
-          <dgm:constr type="ctrX" for="ch" forName="ThreeNodes_2" refType="w" fact="0.5"/>
-          <dgm:constr type="w" for="ch" forName="ThreeNodes_3" refType="w" fact="0.85"/>
-          <dgm:constr type="h" for="ch" forName="ThreeNodes_3" refType="h" fact="0.3"/>
-          <dgm:constr type="b" for="ch" forName="ThreeNodes_3" refType="h"/>
-          <dgm:constr type="r" for="ch" forName="ThreeNodes_3" refType="w"/>
-          <dgm:constr type="w" for="ch" forName="ThreeConn_1-2" refType="h" refFor="ch" refForName="ThreeNodes_1" fact="0.65"/>
-          <dgm:constr type="h" for="ch" forName="ThreeConn_1-2" refType="h" refFor="ch" refForName="ThreeNodes_1" fact="0.65"/>
-          <dgm:constr type="ctrY" for="ch" forName="ThreeConn_1-2" refType="h" fact="0.325"/>
-          <dgm:constr type="r" for="ch" forName="ThreeConn_1-2" refType="r" refFor="ch" refForName="ThreeNodes_1"/>
-          <dgm:constr type="w" for="ch" forName="ThreeConn_2-3" refType="h" refFor="ch" refForName="ThreeNodes_2" fact="0.65"/>
-          <dgm:constr type="h" for="ch" forName="ThreeConn_2-3" refType="h" refFor="ch" refForName="ThreeNodes_2" fact="0.65"/>
-          <dgm:constr type="ctrY" for="ch" forName="ThreeConn_2-3" refType="h" fact="0.673"/>
-          <dgm:constr type="r" for="ch" forName="ThreeConn_2-3" refType="r" refFor="ch" refForName="ThreeNodes_2"/>
-          <dgm:constr type="r" for="ch" forName="ThreeNodes_1_text" refType="l" refFor="ch" refForName="ThreeConn_1-2"/>
-          <dgm:constr type="rOff" for="ch" forName="ThreeNodes_1_text" refType="w" refFor="ch" refForName="ThreeConn_1-2" fact="-0.57"/>
-          <dgm:constr type="t" for="ch" forName="ThreeNodes_1_text" refType="t" refFor="ch" refForName="ThreeNodes_1"/>
-          <dgm:constr type="b" for="ch" forName="ThreeNodes_1_text" refType="b" refFor="ch" refForName="ThreeNodes_1"/>
-          <dgm:constr type="l" for="ch" forName="ThreeNodes_1_text" refType="l" refFor="ch" refForName="ThreeNodes_1"/>
-          <dgm:constr type="r" for="ch" forName="ThreeNodes_2_text" refType="l" refFor="ch" refForName="ThreeConn_1-2"/>
-          <dgm:constr type="t" for="ch" forName="ThreeNodes_2_text" refType="t" refFor="ch" refForName="ThreeNodes_2"/>
-          <dgm:constr type="b" for="ch" forName="ThreeNodes_2_text" refType="b" refFor="ch" refForName="ThreeNodes_2"/>
-          <dgm:constr type="l" for="ch" forName="ThreeNodes_2_text" refType="l" refFor="ch" refForName="ThreeNodes_2"/>
-          <dgm:constr type="r" for="ch" forName="ThreeNodes_3_text" refType="l" refFor="ch" refForName="ThreeConn_2-3"/>
-          <dgm:constr type="t" for="ch" forName="ThreeNodes_3_text" refType="t" refFor="ch" refForName="ThreeNodes_3"/>
-          <dgm:constr type="b" for="ch" forName="ThreeNodes_3_text" refType="b" refFor="ch" refForName="ThreeNodes_3"/>
-          <dgm:constr type="l" for="ch" forName="ThreeNodes_3_text" refType="l" refFor="ch" refForName="ThreeNodes_3"/>
-          <dgm:constr type="w" for="ch" forName="FourNodes_1" refType="w" fact="0.8"/>
-          <dgm:constr type="h" for="ch" forName="FourNodes_1" refType="h" fact="0.22"/>
-          <dgm:constr type="t" for="ch" forName="FourNodes_1"/>
-          <dgm:constr type="l" for="ch" forName="FourNodes_1"/>
-          <dgm:constr type="w" for="ch" forName="FourNodes_2" refType="w" fact="0.8"/>
-          <dgm:constr type="h" for="ch" forName="FourNodes_2" refType="h" fact="0.22"/>
-          <dgm:constr type="ctrY" for="ch" forName="FourNodes_2" refType="h" fact="0.37"/>
-          <dgm:constr type="ctrX" for="ch" forName="FourNodes_2" refType="w" fact="0.467"/>
-          <dgm:constr type="w" for="ch" forName="FourNodes_3" refType="w" fact="0.8"/>
-          <dgm:constr type="h" for="ch" forName="FourNodes_3" refType="h" fact="0.22"/>
-          <dgm:constr type="ctrY" for="ch" forName="FourNodes_3" refType="h" fact="0.63"/>
-          <dgm:constr type="ctrX" for="ch" forName="FourNodes_3" refType="w" fact="0.533"/>
-          <dgm:constr type="w" for="ch" forName="FourNodes_4" refType="w" fact="0.8"/>
-          <dgm:constr type="h" for="ch" forName="FourNodes_4" refType="h" fact="0.22"/>
-          <dgm:constr type="b" for="ch" forName="FourNodes_4" refType="h"/>
-          <dgm:constr type="r" for="ch" forName="FourNodes_4" refType="w"/>
-          <dgm:constr type="w" for="ch" forName="FourConn_1-2" refType="h" refFor="ch" refForName="FourNodes_1" fact="0.65"/>
-          <dgm:constr type="h" for="ch" forName="FourConn_1-2" refType="h" refFor="ch" refForName="FourNodes_1" fact="0.65"/>
-          <dgm:constr type="ctrY" for="ch" forName="FourConn_1-2" refType="h" fact="0.24"/>
-          <dgm:constr type="r" for="ch" forName="FourConn_1-2" refType="r" refFor="ch" refForName="FourNodes_1"/>
-          <dgm:constr type="w" for="ch" forName="FourConn_2-3" refType="h" refFor="ch" refForName="FourNodes_2" fact="0.65"/>
-          <dgm:constr type="h" for="ch" forName="FourConn_2-3" refType="h" refFor="ch" refForName="FourNodes_2" fact="0.65"/>
-          <dgm:constr type="ctrY" for="ch" forName="FourConn_2-3" refType="h" fact="0.5"/>
-          <dgm:constr type="r" for="ch" forName="FourConn_2-3" refType="r" refFor="ch" refForName="FourNodes_2"/>
-          <dgm:constr type="w" for="ch" forName="FourConn_3-4" refType="h" refFor="ch" refForName="FourNodes_3" fact="0.65"/>
-          <dgm:constr type="h" for="ch" forName="FourConn_3-4" refType="h" refFor="ch" refForName="FourNodes_3" fact="0.65"/>
-          <dgm:constr type="ctrY" for="ch" forName="FourConn_3-4" refType="h" fact="0.76"/>
-          <dgm:constr type="r" for="ch" forName="FourConn_3-4" refType="r" refFor="ch" refForName="FourNodes_3"/>
-          <dgm:constr type="r" for="ch" forName="FourNodes_1_text" refType="l" refFor="ch" refForName="FourConn_1-2"/>
-          <dgm:constr type="rOff" for="ch" forName="FourNodes_1_text" refType="w" refFor="ch" refForName="FourConn_1-2" fact="-0.7"/>
-          <dgm:constr type="t" for="ch" forName="FourNodes_1_text" refType="t" refFor="ch" refForName="FourNodes_1"/>
-          <dgm:constr type="b" for="ch" forName="FourNodes_1_text" refType="b" refFor="ch" refForName="FourNodes_1"/>
-          <dgm:constr type="l" for="ch" forName="FourNodes_1_text" refType="l" refFor="ch" refForName="FourNodes_1"/>
-          <dgm:constr type="r" for="ch" forName="FourNodes_2_text" refType="l" refFor="ch" refForName="FourConn_1-2"/>
-          <dgm:constr type="t" for="ch" forName="FourNodes_2_text" refType="t" refFor="ch" refForName="FourNodes_2"/>
-          <dgm:constr type="b" for="ch" forName="FourNodes_2_text" refType="b" refFor="ch" refForName="FourNodes_2"/>
-          <dgm:constr type="l" for="ch" forName="FourNodes_2_text" refType="l" refFor="ch" refForName="FourNodes_2"/>
-          <dgm:constr type="r" for="ch" forName="FourNodes_3_text" refType="l" refFor="ch" refForName="FourConn_2-3"/>
-          <dgm:constr type="t" for="ch" forName="FourNodes_3_text" refType="t" refFor="ch" refForName="FourNodes_3"/>
-          <dgm:constr type="b" for="ch" forName="FourNodes_3_text" refType="b" refFor="ch" refForName="FourNodes_3"/>
-          <dgm:constr type="l" for="ch" forName="FourNodes_3_text" refType="l" refFor="ch" refForName="FourNodes_3"/>
-          <dgm:constr type="r" for="ch" forName="FourNodes_4_text" refType="l" refFor="ch" refForName="FourConn_3-4"/>
-          <dgm:constr type="t" for="ch" forName="FourNodes_4_text" refType="t" refFor="ch" refForName="FourNodes_4"/>
-          <dgm:constr type="b" for="ch" forName="FourNodes_4_text" refType="b" refFor="ch" refForName="FourNodes_4"/>
-          <dgm:constr type="l" for="ch" forName="FourNodes_4_text" refType="l" refFor="ch" refForName="FourNodes_4"/>
-          <dgm:constr type="w" for="ch" forName="FiveNodes_1" refType="w" fact="0.77"/>
-          <dgm:constr type="h" for="ch" forName="FiveNodes_1" refType="h" fact="0.18"/>
-          <dgm:constr type="t" for="ch" forName="FiveNodes_1"/>
-          <dgm:constr type="l" for="ch" forName="FiveNodes_1"/>
-          <dgm:constr type="w" for="ch" forName="FiveNodes_2" refType="w" fact="0.77"/>
-          <dgm:constr type="h" for="ch" forName="FiveNodes_2" refType="h" fact="0.18"/>
-          <dgm:constr type="ctrY" for="ch" forName="FiveNodes_2" refType="h" fact="0.295"/>
-          <dgm:constr type="ctrX" for="ch" forName="FiveNodes_2" refType="w" fact="0.4425"/>
-          <dgm:constr type="w" for="ch" forName="FiveNodes_3" refType="w" fact="0.77"/>
-          <dgm:constr type="h" for="ch" forName="FiveNodes_3" refType="h" fact="0.18"/>
-          <dgm:constr type="ctrY" for="ch" forName="FiveNodes_3" refType="h" fact="0.5"/>
-          <dgm:constr type="ctrX" for="ch" forName="FiveNodes_3" refType="w" fact="0.5"/>
-          <dgm:constr type="w" for="ch" forName="FiveNodes_4" refType="w" fact="0.77"/>
-          <dgm:constr type="h" for="ch" forName="FiveNodes_4" refType="h" fact="0.18"/>
-          <dgm:constr type="ctrY" for="ch" forName="FiveNodes_4" refType="h" fact="0.705"/>
-          <dgm:constr type="ctrX" for="ch" forName="FiveNodes_4" refType="w" fact="0.5575"/>
-          <dgm:constr type="w" for="ch" forName="FiveNodes_5" refType="w" fact="0.77"/>
-          <dgm:constr type="h" for="ch" forName="FiveNodes_5" refType="h" fact="0.18"/>
-          <dgm:constr type="b" for="ch" forName="FiveNodes_5" refType="h"/>
-          <dgm:constr type="r" for="ch" forName="FiveNodes_5" refType="w"/>
-          <dgm:constr type="w" for="ch" forName="FiveConn_1-2" refType="h" refFor="ch" refForName="FiveNodes_1" fact="0.65"/>
-          <dgm:constr type="h" for="ch" forName="FiveConn_1-2" refType="h" refFor="ch" refForName="FiveNodes_1" fact="0.65"/>
-          <dgm:constr type="ctrY" for="ch" forName="FiveConn_1-2" refType="h" fact="0.19"/>
-          <dgm:constr type="r" for="ch" forName="FiveConn_1-2" refType="r" refFor="ch" refForName="FiveNodes_1"/>
-          <dgm:constr type="w" for="ch" forName="FiveConn_2-3" refType="h" refFor="ch" refForName="FiveNodes_2" fact="0.65"/>
-          <dgm:constr type="h" for="ch" forName="FiveConn_2-3" refType="h" refFor="ch" refForName="FiveNodes_2" fact="0.65"/>
-          <dgm:constr type="ctrY" for="ch" forName="FiveConn_2-3" refType="h" fact="0.395"/>
-          <dgm:constr type="r" for="ch" forName="FiveConn_2-3" refType="r" refFor="ch" refForName="FiveNodes_2"/>
-          <dgm:constr type="w" for="ch" forName="FiveConn_3-4" refType="h" refFor="ch" refForName="FiveNodes_3" fact="0.65"/>
-          <dgm:constr type="h" for="ch" forName="FiveConn_3-4" refType="h" refFor="ch" refForName="FiveNodes_3" fact="0.65"/>
-          <dgm:constr type="ctrY" for="ch" forName="FiveConn_3-4" refType="h" fact="0.597"/>
-          <dgm:constr type="r" for="ch" forName="FiveConn_3-4" refType="r" refFor="ch" refForName="FiveNodes_3"/>
-          <dgm:constr type="w" for="ch" forName="FiveConn_4-5" refType="h" refFor="ch" refForName="FiveNodes_4" fact="0.65"/>
-          <dgm:constr type="h" for="ch" forName="FiveConn_4-5" refType="h" refFor="ch" refForName="FiveNodes_4" fact="0.65"/>
-          <dgm:constr type="ctrY" for="ch" forName="FiveConn_4-5" refType="h" fact="0.804"/>
-          <dgm:constr type="r" for="ch" forName="FiveConn_4-5" refType="r" refFor="ch" refForName="FiveNodes_4"/>
-          <dgm:constr type="r" for="ch" forName="FiveNodes_1_text" refType="l" refFor="ch" refForName="FiveConn_1-2"/>
-          <dgm:constr type="rOff" for="ch" forName="FiveNodes_1_text" refType="w" refFor="ch" refForName="FiveConn_1-2" fact="-0.75"/>
-          <dgm:constr type="t" for="ch" forName="FiveNodes_1_text" refType="t" refFor="ch" refForName="FiveNodes_1"/>
-          <dgm:constr type="b" for="ch" forName="FiveNodes_1_text" refType="b" refFor="ch" refForName="FiveNodes_1"/>
-          <dgm:constr type="l" for="ch" forName="FiveNodes_1_text" refType="l" refFor="ch" refForName="FiveNodes_1"/>
-          <dgm:constr type="r" for="ch" forName="FiveNodes_2_text" refType="l" refFor="ch" refForName="FiveConn_1-2"/>
-          <dgm:constr type="t" for="ch" forName="FiveNodes_2_text" refType="t" refFor="ch" refForName="FiveNodes_2"/>
-          <dgm:constr type="b" for="ch" forName="FiveNodes_2_text" refType="b" refFor="ch" refForName="FiveNodes_2"/>
-          <dgm:constr type="l" for="ch" forName="FiveNodes_2_text" refType="l" refFor="ch" refForName="FiveNodes_2"/>
-          <dgm:constr type="r" for="ch" forName="FiveNodes_3_text" refType="l" refFor="ch" refForName="FiveConn_2-3"/>
-          <dgm:constr type="t" for="ch" forName="FiveNodes_3_text" refType="t" refFor="ch" refForName="FiveNodes_3"/>
-          <dgm:constr type="b" for="ch" forName="FiveNodes_3_text" refType="b" refFor="ch" refForName="FiveNodes_3"/>
-          <dgm:constr type="l" for="ch" forName="FiveNodes_3_text" refType="l" refFor="ch" refForName="FiveNodes_3"/>
-          <dgm:constr type="r" for="ch" forName="FiveNodes_4_text" refType="l" refFor="ch" refForName="FiveConn_3-4"/>
-          <dgm:constr type="t" for="ch" forName="FiveNodes_4_text" refType="t" refFor="ch" refForName="FiveNodes_4"/>
-          <dgm:constr type="b" for="ch" forName="FiveNodes_4_text" refType="b" refFor="ch" refForName="FiveNodes_4"/>
-          <dgm:constr type="l" for="ch" forName="FiveNodes_4_text" refType="l" refFor="ch" refForName="FiveNodes_4"/>
-          <dgm:constr type="r" for="ch" forName="FiveNodes_5_text" refType="l" refFor="ch" refForName="FiveConn_4-5"/>
-          <dgm:constr type="t" for="ch" forName="FiveNodes_5_text" refType="t" refFor="ch" refForName="FiveNodes_5"/>
-          <dgm:constr type="b" for="ch" forName="FiveNodes_5_text" refType="b" refFor="ch" refForName="FiveNodes_5"/>
-          <dgm:constr type="l" for="ch" forName="FiveNodes_5_text" refType="l" refFor="ch" refForName="FiveNodes_5"/>
-        </dgm:constrLst>
-      </dgm:if>
-      <dgm:else name="Name2">
-        <dgm:constrLst>
-          <dgm:constr type="primFontSz" for="ch" ptType="node" op="equ" val="65"/>
-          <dgm:constr type="w" for="ch" forName="dummyMaxCanvas" refType="w"/>
-          <dgm:constr type="h" for="ch" forName="dummyMaxCanvas" refType="h"/>
-          <dgm:constr type="w" for="ch" forName="OneNode_1" refType="w"/>
-          <dgm:constr type="h" for="ch" forName="OneNode_1" refType="h" fact="0.5"/>
-          <dgm:constr type="ctrY" for="ch" forName="OneNode_1" refType="h" fact="0.5"/>
-          <dgm:constr type="w" for="ch" forName="TwoNodes_1" refType="w" fact="0.85"/>
-          <dgm:constr type="h" for="ch" forName="TwoNodes_1" refType="h" fact="0.45"/>
-          <dgm:constr type="t" for="ch" forName="TwoNodes_1"/>
-          <dgm:constr type="r" for="ch" forName="TwoNodes_1" refType="w"/>
-          <dgm:constr type="w" for="ch" forName="TwoNodes_2" refType="w" fact="0.85"/>
-          <dgm:constr type="h" for="ch" forName="TwoNodes_2" refType="h" fact="0.45"/>
-          <dgm:constr type="b" for="ch" forName="TwoNodes_2" refType="h"/>
-          <dgm:constr type="l" for="ch" forName="TwoNodes_2"/>
-          <dgm:constr type="w" for="ch" forName="TwoConn_1-2" refType="h" refFor="ch" refForName="TwoNodes_1" fact="0.65"/>
-          <dgm:constr type="h" for="ch" forName="TwoConn_1-2" refType="h" refFor="ch" refForName="TwoNodes_1" fact="0.65"/>
-          <dgm:constr type="ctrY" for="ch" forName="TwoConn_1-2" refType="h" fact="0.5"/>
-          <dgm:constr type="l" for="ch" forName="TwoConn_1-2" refType="l" refFor="ch" refForName="TwoNodes_1"/>
-          <dgm:constr type="l" for="ch" forName="TwoNodes_1_text" refType="r" refFor="ch" refForName="TwoConn_1-2"/>
-          <dgm:constr type="lOff" for="ch" forName="TwoNodes_1_text" refType="w" refFor="ch" refForName="TwoConn_1-2" fact="0.5"/>
-          <dgm:constr type="t" for="ch" forName="TwoNodes_1_text" refType="t" refFor="ch" refForName="TwoNodes_1"/>
-          <dgm:constr type="b" for="ch" forName="TwoNodes_1_text" refType="b" refFor="ch" refForName="TwoNodes_1"/>
-          <dgm:constr type="r" for="ch" forName="TwoNodes_1_text" refType="r" refFor="ch" refForName="TwoNodes_1"/>
-          <dgm:constr type="l" for="ch" forName="TwoNodes_2_text" refType="r" refFor="ch" refForName="TwoConn_1-2"/>
-          <dgm:constr type="t" for="ch" forName="TwoNodes_2_text" refType="t" refFor="ch" refForName="TwoNodes_2"/>
-          <dgm:constr type="b" for="ch" forName="TwoNodes_2_text" refType="b" refFor="ch" refForName="TwoNodes_2"/>
-          <dgm:constr type="r" for="ch" forName="TwoNodes_2_text" refType="r" refFor="ch" refForName="TwoNodes_2"/>
-          <dgm:constr type="w" for="ch" forName="ThreeNodes_1" refType="w" fact="0.85"/>
-          <dgm:constr type="h" for="ch" forName="ThreeNodes_1" refType="h" fact="0.3"/>
-          <dgm:constr type="t" for="ch" forName="ThreeNodes_1"/>
-          <dgm:constr type="r" for="ch" forName="ThreeNodes_1" refType="w"/>
-          <dgm:constr type="w" for="ch" forName="ThreeNodes_2" refType="w" fact="0.85"/>
-          <dgm:constr type="h" for="ch" forName="ThreeNodes_2" refType="h" fact="0.3"/>
-          <dgm:constr type="ctrY" for="ch" forName="ThreeNodes_2" refType="h" fact="0.5"/>
-          <dgm:constr type="ctrX" for="ch" forName="ThreeNodes_2" refType="w" fact="0.5"/>
-          <dgm:constr type="w" for="ch" forName="ThreeNodes_3" refType="w" fact="0.85"/>
-          <dgm:constr type="h" for="ch" forName="ThreeNodes_3" refType="h" fact="0.3"/>
-          <dgm:constr type="b" for="ch" forName="ThreeNodes_3" refType="h"/>
-          <dgm:constr type="l" for="ch" forName="ThreeNodes_3"/>
-          <dgm:constr type="w" for="ch" forName="ThreeConn_1-2" refType="h" refFor="ch" refForName="ThreeNodes_1" fact="0.65"/>
-          <dgm:constr type="h" for="ch" forName="ThreeConn_1-2" refType="h" refFor="ch" refForName="ThreeNodes_1" fact="0.65"/>
-          <dgm:constr type="ctrY" for="ch" forName="ThreeConn_1-2" refType="h" fact="0.325"/>
-          <dgm:constr type="l" for="ch" forName="ThreeConn_1-2" refType="l" refFor="ch" refForName="ThreeNodes_1"/>
-          <dgm:constr type="w" for="ch" forName="ThreeConn_2-3" refType="h" refFor="ch" refForName="ThreeNodes_2" fact="0.65"/>
-          <dgm:constr type="h" for="ch" forName="ThreeConn_2-3" refType="h" refFor="ch" refForName="ThreeNodes_2" fact="0.65"/>
-          <dgm:constr type="ctrY" for="ch" forName="ThreeConn_2-3" refType="h" fact="0.673"/>
-          <dgm:constr type="l" for="ch" forName="ThreeConn_2-3" refType="l" refFor="ch" refForName="ThreeNodes_2"/>
-          <dgm:constr type="l" for="ch" forName="ThreeNodes_1_text" refType="r" refFor="ch" refForName="ThreeConn_1-2"/>
-          <dgm:constr type="lOff" for="ch" forName="ThreeNodes_1_text" refType="w" refFor="ch" refForName="ThreeConn_1-2" fact="0.55"/>
-          <dgm:constr type="t" for="ch" forName="ThreeNodes_1_text" refType="t" refFor="ch" refForName="ThreeNodes_1"/>
-          <dgm:constr type="b" for="ch" forName="ThreeNodes_1_text" refType="b" refFor="ch" refForName="ThreeNodes_1"/>
-          <dgm:constr type="r" for="ch" forName="ThreeNodes_1_text" refType="r" refFor="ch" refForName="ThreeNodes_1"/>
-          <dgm:constr type="l" for="ch" forName="ThreeNodes_2_text" refType="r" refFor="ch" refForName="ThreeConn_1-2"/>
-          <dgm:constr type="t" for="ch" forName="ThreeNodes_2_text" refType="t" refFor="ch" refForName="ThreeNodes_2"/>
-          <dgm:constr type="b" for="ch" forName="ThreeNodes_2_text" refType="b" refFor="ch" refForName="ThreeNodes_2"/>
-          <dgm:constr type="r" for="ch" forName="ThreeNodes_2_text" refType="r" refFor="ch" refForName="ThreeNodes_2"/>
-          <dgm:constr type="l" for="ch" forName="ThreeNodes_3_text" refType="r" refFor="ch" refForName="ThreeConn_2-3"/>
-          <dgm:constr type="t" for="ch" forName="ThreeNodes_3_text" refType="t" refFor="ch" refForName="ThreeNodes_3"/>
-          <dgm:constr type="b" for="ch" forName="ThreeNodes_3_text" refType="b" refFor="ch" refForName="ThreeNodes_3"/>
-          <dgm:constr type="r" for="ch" forName="ThreeNodes_3_text" refType="r" refFor="ch" refForName="ThreeNodes_3"/>
-          <dgm:constr type="w" for="ch" forName="FourNodes_1" refType="w" fact="0.8"/>
-          <dgm:constr type="h" for="ch" forName="FourNodes_1" refType="h" fact="0.22"/>
-          <dgm:constr type="t" for="ch" forName="FourNodes_1"/>
-          <dgm:constr type="r" for="ch" forName="FourNodes_1" refType="w"/>
-          <dgm:constr type="w" for="ch" forName="FourNodes_2" refType="w" fact="0.8"/>
-          <dgm:constr type="h" for="ch" forName="FourNodes_2" refType="h" fact="0.22"/>
-          <dgm:constr type="ctrY" for="ch" forName="FourNodes_2" refType="h" fact="0.37"/>
-          <dgm:constr type="ctrX" for="ch" forName="FourNodes_2" refType="w" fact="0.533"/>
-          <dgm:constr type="w" for="ch" forName="FourNodes_3" refType="w" fact="0.8"/>
-          <dgm:constr type="h" for="ch" forName="FourNodes_3" refType="h" fact="0.22"/>
-          <dgm:constr type="ctrY" for="ch" forName="FourNodes_3" refType="h" fact="0.63"/>
-          <dgm:constr type="ctrX" for="ch" forName="FourNodes_3" refType="w" fact="0.467"/>
-          <dgm:constr type="w" for="ch" forName="FourNodes_4" refType="w" fact="0.8"/>
-          <dgm:constr type="h" for="ch" forName="FourNodes_4" refType="h" fact="0.22"/>
-          <dgm:constr type="b" for="ch" forName="FourNodes_4" refType="h"/>
-          <dgm:constr type="l" for="ch" forName="FourNodes_4"/>
-          <dgm:constr type="w" for="ch" forName="FourConn_1-2" refType="h" refFor="ch" refForName="FourNodes_1" fact="0.65"/>
-          <dgm:constr type="h" for="ch" forName="FourConn_1-2" refType="h" refFor="ch" refForName="FourNodes_1" fact="0.65"/>
-          <dgm:constr type="ctrY" for="ch" forName="FourConn_1-2" refType="h" fact="0.24"/>
-          <dgm:constr type="l" for="ch" forName="FourConn_1-2" refType="l" refFor="ch" refForName="FourNodes_1"/>
-          <dgm:constr type="w" for="ch" forName="FourConn_2-3" refType="h" refFor="ch" refForName="FourNodes_2" fact="0.65"/>
-          <dgm:constr type="h" for="ch" forName="FourConn_2-3" refType="h" refFor="ch" refForName="FourNodes_2" fact="0.65"/>
-          <dgm:constr type="ctrY" for="ch" forName="FourConn_2-3" refType="h" fact="0.5"/>
-          <dgm:constr type="l" for="ch" forName="FourConn_2-3" refType="l" refFor="ch" refForName="FourNodes_2"/>
-          <dgm:constr type="w" for="ch" forName="FourConn_3-4" refType="h" refFor="ch" refForName="FourNodes_3" fact="0.65"/>
-          <dgm:constr type="h" for="ch" forName="FourConn_3-4" refType="h" refFor="ch" refForName="FourNodes_3" fact="0.65"/>
-          <dgm:constr type="ctrY" for="ch" forName="FourConn_3-4" refType="h" fact="0.76"/>
-          <dgm:constr type="l" for="ch" forName="FourConn_3-4" refType="l" refFor="ch" refForName="FourNodes_3"/>
-          <dgm:constr type="l" for="ch" forName="FourNodes_1_text" refType="r" refFor="ch" refForName="FourConn_1-2"/>
-          <dgm:constr type="lOff" for="ch" forName="FourNodes_1_text" refType="w" refFor="ch" refForName="FourConn_1-2" fact="0.69"/>
-          <dgm:constr type="t" for="ch" forName="FourNodes_1_text" refType="t" refFor="ch" refForName="FourNodes_1"/>
-          <dgm:constr type="b" for="ch" forName="FourNodes_1_text" refType="b" refFor="ch" refForName="FourNodes_1"/>
-          <dgm:constr type="r" for="ch" forName="FourNodes_1_text" refType="r" refFor="ch" refForName="FourNodes_1"/>
-          <dgm:constr type="l" for="ch" forName="FourNodes_2_text" refType="r" refFor="ch" refForName="FourConn_1-2"/>
-          <dgm:constr type="t" for="ch" forName="FourNodes_2_text" refType="t" refFor="ch" refForName="FourNodes_2"/>
-          <dgm:constr type="b" for="ch" forName="FourNodes_2_text" refType="b" refFor="ch" refForName="FourNodes_2"/>
-          <dgm:constr type="r" for="ch" forName="FourNodes_2_text" refType="r" refFor="ch" refForName="FourNodes_2"/>
-          <dgm:constr type="l" for="ch" forName="FourNodes_3_text" refType="r" refFor="ch" refForName="FourConn_2-3"/>
-          <dgm:constr type="t" for="ch" forName="FourNodes_3_text" refType="t" refFor="ch" refForName="FourNodes_3"/>
-          <dgm:constr type="b" for="ch" forName="FourNodes_3_text" refType="b" refFor="ch" refForName="FourNodes_3"/>
-          <dgm:constr type="r" for="ch" forName="FourNodes_3_text" refType="r" refFor="ch" refForName="FourNodes_3"/>
-          <dgm:constr type="l" for="ch" forName="FourNodes_4_text" refType="r" refFor="ch" refForName="FourConn_3-4"/>
-          <dgm:constr type="t" for="ch" forName="FourNodes_4_text" refType="t" refFor="ch" refForName="FourNodes_4"/>
-          <dgm:constr type="b" for="ch" forName="FourNodes_4_text" refType="b" refFor="ch" refForName="FourNodes_4"/>
-          <dgm:constr type="r" for="ch" forName="FourNodes_4_text" refType="r" refFor="ch" refForName="FourNodes_4"/>
-          <dgm:constr type="w" for="ch" forName="FiveNodes_1" refType="w" fact="0.77"/>
-          <dgm:constr type="h" for="ch" forName="FiveNodes_1" refType="h" fact="0.18"/>
-          <dgm:constr type="t" for="ch" forName="FiveNodes_1"/>
-          <dgm:constr type="r" for="ch" forName="FiveNodes_1" refType="w"/>
-          <dgm:constr type="w" for="ch" forName="FiveNodes_2" refType="w" fact="0.77"/>
-          <dgm:constr type="h" for="ch" forName="FiveNodes_2" refType="h" fact="0.18"/>
-          <dgm:constr type="ctrY" for="ch" forName="FiveNodes_2" refType="h" fact="0.295"/>
-          <dgm:constr type="ctrX" for="ch" forName="FiveNodes_2" refType="w" fact="0.5575"/>
-          <dgm:constr type="w" for="ch" forName="FiveNodes_3" refType="w" fact="0.77"/>
-          <dgm:constr type="h" for="ch" forName="FiveNodes_3" refType="h" fact="0.18"/>
-          <dgm:constr type="ctrY" for="ch" forName="FiveNodes_3" refType="h" fact="0.5"/>
-          <dgm:constr type="ctrX" for="ch" forName="FiveNodes_3" refType="w" fact="0.5"/>
-          <dgm:constr type="w" for="ch" forName="FiveNodes_4" refType="w" fact="0.77"/>
-          <dgm:constr type="h" for="ch" forName="FiveNodes_4" refType="h" fact="0.18"/>
-          <dgm:constr type="ctrY" for="ch" forName="FiveNodes_4" refType="h" fact="0.705"/>
-          <dgm:constr type="ctrX" for="ch" forName="FiveNodes_4" refType="w" fact="0.4425"/>
-          <dgm:constr type="w" for="ch" forName="FiveNodes_5" refType="w" fact="0.77"/>
-          <dgm:constr type="h" for="ch" forName="FiveNodes_5" refType="h" fact="0.18"/>
-          <dgm:constr type="b" for="ch" forName="FiveNodes_5" refType="h"/>
-          <dgm:constr type="l" for="ch" forName="FiveNodes_5"/>
-          <dgm:constr type="w" for="ch" forName="FiveConn_1-2" refType="h" refFor="ch" refForName="FiveNodes_1" fact="0.65"/>
-          <dgm:constr type="h" for="ch" forName="FiveConn_1-2" refType="h" refFor="ch" refForName="FiveNodes_1" fact="0.65"/>
-          <dgm:constr type="ctrY" for="ch" forName="FiveConn_1-2" refType="h" fact="0.19"/>
-          <dgm:constr type="l" for="ch" forName="FiveConn_1-2" refType="l" refFor="ch" refForName="FiveNodes_1"/>
-          <dgm:constr type="w" for="ch" forName="FiveConn_2-3" refType="h" refFor="ch" refForName="FiveNodes_2" fact="0.65"/>
-          <dgm:constr type="h" for="ch" forName="FiveConn_2-3" refType="h" refFor="ch" refForName="FiveNodes_2" fact="0.65"/>
-          <dgm:constr type="ctrY" for="ch" forName="FiveConn_2-3" refType="h" fact="0.395"/>
-          <dgm:constr type="l" for="ch" forName="FiveConn_2-3" refType="l" refFor="ch" refForName="FiveNodes_2"/>
-          <dgm:constr type="w" for="ch" forName="FiveConn_3-4" refType="h" refFor="ch" refForName="FiveNodes_3" fact="0.65"/>
-          <dgm:constr type="h" for="ch" forName="FiveConn_3-4" refType="h" refFor="ch" refForName="FiveNodes_3" fact="0.65"/>
-          <dgm:constr type="ctrY" for="ch" forName="FiveConn_3-4" refType="h" fact="0.597"/>
-          <dgm:constr type="l" for="ch" forName="FiveConn_3-4" refType="l" refFor="ch" refForName="FiveNodes_3"/>
-          <dgm:constr type="w" for="ch" forName="FiveConn_4-5" refType="h" refFor="ch" refForName="FiveNodes_4" fact="0.65"/>
-          <dgm:constr type="h" for="ch" forName="FiveConn_4-5" refType="h" refFor="ch" refForName="FiveNodes_4" fact="0.65"/>
-          <dgm:constr type="ctrY" for="ch" forName="FiveConn_4-5" refType="h" fact="0.804"/>
-          <dgm:constr type="l" for="ch" forName="FiveConn_4-5" refType="l" refFor="ch" refForName="FiveNodes_4"/>
-          <dgm:constr type="l" for="ch" forName="FiveNodes_1_text" refType="r" refFor="ch" refForName="FiveConn_1-2"/>
-          <dgm:constr type="lOff" for="ch" forName="FiveNodes_1_text" refType="w" refFor="ch" refForName="FiveConn_1-2" fact="0.73"/>
-          <dgm:constr type="t" for="ch" forName="FiveNodes_1_text" refType="t" refFor="ch" refForName="FiveNodes_1"/>
-          <dgm:constr type="b" for="ch" forName="FiveNodes_1_text" refType="b" refFor="ch" refForName="FiveNodes_1"/>
-          <dgm:constr type="r" for="ch" forName="FiveNodes_1_text" refType="r" refFor="ch" refForName="FiveNodes_1"/>
-          <dgm:constr type="l" for="ch" forName="FiveNodes_2_text" refType="r" refFor="ch" refForName="FiveConn_1-2"/>
-          <dgm:constr type="t" for="ch" forName="FiveNodes_2_text" refType="t" refFor="ch" refForName="FiveNodes_2"/>
-          <dgm:constr type="b" for="ch" forName="FiveNodes_2_text" refType="b" refFor="ch" refForName="FiveNodes_2"/>
-          <dgm:constr type="r" for="ch" forName="FiveNodes_2_text" refType="r" refFor="ch" refForName="FiveNodes_2"/>
-          <dgm:constr type="l" for="ch" forName="FiveNodes_3_text" refType="r" refFor="ch" refForName="FiveConn_2-3"/>
-          <dgm:constr type="t" for="ch" forName="FiveNodes_3_text" refType="t" refFor="ch" refForName="FiveNodes_3"/>
-          <dgm:constr type="b" for="ch" forName="FiveNodes_3_text" refType="b" refFor="ch" refForName="FiveNodes_3"/>
-          <dgm:constr type="r" for="ch" forName="FiveNodes_3_text" refType="r" refFor="ch" refForName="FiveNodes_3"/>
-          <dgm:constr type="l" for="ch" forName="FiveNodes_4_text" refType="r" refFor="ch" refForName="FiveConn_3-4"/>
-          <dgm:constr type="t" for="ch" forName="FiveNodes_4_text" refType="t" refFor="ch" refForName="FiveNodes_4"/>
-          <dgm:constr type="b" for="ch" forName="FiveNodes_4_text" refType="b" refFor="ch" refForName="FiveNodes_4"/>
-          <dgm:constr type="r" for="ch" forName="FiveNodes_4_text" refType="r" refFor="ch" refForName="FiveNodes_4"/>
-          <dgm:constr type="l" for="ch" forName="FiveNodes_5_text" refType="r" refFor="ch" refForName="FiveConn_4-5"/>
-          <dgm:constr type="t" for="ch" forName="FiveNodes_5_text" refType="t" refFor="ch" refForName="FiveNodes_5"/>
-          <dgm:constr type="b" for="ch" forName="FiveNodes_5_text" refType="b" refFor="ch" refForName="FiveNodes_5"/>
-          <dgm:constr type="r" for="ch" forName="FiveNodes_5_text" refType="r" refFor="ch" refForName="FiveNodes_5"/>
-        </dgm:constrLst>
-      </dgm:else>
-    </dgm:choose>
+    <dgm:constrLst>
+      <dgm:constr type="h" for="ch" forName="boxAndChildren" refType="h"/>
+      <dgm:constr type="h" for="ch" forName="arrowAndChildren" refType="h" refFor="ch" refForName="boxAndChildren" op="equ" fact="1.538"/>
+      <dgm:constr type="w" for="ch" forName="arrowAndChildren" refType="w"/>
+      <dgm:constr type="w" for="ch" forName="boxAndChildren" refType="w"/>
+      <dgm:constr type="h" for="ch" forName="sp" refType="h" fact="-0.015"/>
+      <dgm:constr type="primFontSz" for="des" forName="parentTextBox" val="65"/>
+      <dgm:constr type="primFontSz" for="des" forName="parentTextArrow" refType="primFontSz" refFor="des" refForName="parentTextBox" op="equ"/>
+      <dgm:constr type="primFontSz" for="des" forName="childTextArrow" val="65"/>
+      <dgm:constr type="primFontSz" for="des" forName="childTextBox" refType="primFontSz" refFor="des" refForName="childTextArrow" op="equ"/>
+    </dgm:constrLst>
     <dgm:ruleLst/>
-    <dgm:layoutNode name="dummyMaxCanvas">
-      <dgm:varLst/>
-      <dgm:alg type="sp"/>
-      <dgm:shape xmlns:r="http://schemas.openxmlformats.org/officeDocument/2006/relationships" r:blip="">
-        <dgm:adjLst/>
-      </dgm:shape>
-      <dgm:presOf/>
-      <dgm:constrLst/>
-      <dgm:ruleLst/>
-    </dgm:layoutNode>
-    <dgm:choose name="Name3">
-      <dgm:if name="Name4" axis="ch" ptType="node" func="cnt" op="equ" val="1">
-        <dgm:layoutNode name="OneNode_1">
-          <dgm:varLst>
-            <dgm:bulletEnabled val="1"/>
-          </dgm:varLst>
-          <dgm:alg type="tx"/>
-          <dgm:shape xmlns:r="http://schemas.openxmlformats.org/officeDocument/2006/relationships" type="roundRect" r:blip="">
-            <dgm:adjLst>
-              <dgm:adj idx="1" val="0.1"/>
-            </dgm:adjLst>
-          </dgm:shape>
-          <dgm:presOf axis="ch desOrSelf" ptType="node node" st="1 1" cnt="1 0"/>
-          <dgm:constrLst>
-            <dgm:constr type="lMarg" refType="primFontSz" fact="0.3"/>
-            <dgm:constr type="rMarg" refType="primFontSz" fact="0.3"/>
-            <dgm:constr type="tMarg" refType="primFontSz" fact="0.3"/>
-            <dgm:constr type="bMarg" refType="primFontSz" fact="0.3"/>
-          </dgm:constrLst>
-          <dgm:ruleLst>
-            <dgm:rule type="primFontSz" val="5" fact="NaN" max="NaN"/>
-          </dgm:ruleLst>
-        </dgm:layoutNode>
-      </dgm:if>
-      <dgm:else name="Name5">
-        <dgm:choose name="Name6">
-          <dgm:if name="Name7" axis="ch" ptType="node" func="cnt" op="equ" val="2">
-            <dgm:layoutNode name="TwoNodes_1">
-              <dgm:varLst>
-                <dgm:bulletEnabled val="1"/>
-              </dgm:varLst>
-              <dgm:alg type="sp"/>
-              <dgm:shape xmlns:r="http://schemas.openxmlformats.org/officeDocument/2006/relationships" type="roundRect" r:blip="">
-                <dgm:adjLst>
-                  <dgm:adj idx="1" val="0.1"/>
-                </dgm:adjLst>
-              </dgm:shape>
-              <dgm:presOf axis="ch desOrSelf" ptType="node node" st="1 1" cnt="1 0"/>
+    <dgm:forEach name="Name1" axis="ch" ptType="node" st="-1" step="-1">
+      <dgm:choose name="Name2">
+        <dgm:if name="Name3" axis="self" ptType="node" func="revPos" op="equ" val="1">
+          <dgm:layoutNode name="boxAndChildren">
+            <dgm:alg type="composite"/>
+            <dgm:shape xmlns:r="http://schemas.openxmlformats.org/officeDocument/2006/relationships" r:blip="">
+              <dgm:adjLst/>
+            </dgm:shape>
+            <dgm:presOf/>
+            <dgm:choose name="Name4">
+              <dgm:if name="Name5" axis="ch" ptType="node" func="cnt" op="gte" val="1">
+                <dgm:constrLst>
+                  <dgm:constr type="w" for="ch" forName="parentTextBox" refType="w"/>
+                  <dgm:constr type="h" for="ch" forName="parentTextBox" refType="h" fact="0.54"/>
+                  <dgm:constr type="t" for="ch" forName="parentTextBox"/>
+                  <dgm:constr type="w" for="ch" forName="entireBox" refType="w"/>
+                  <dgm:constr type="h" for="ch" forName="entireBox" refType="h"/>
+                  <dgm:constr type="w" for="ch" forName="descendantBox" refType="w"/>
+                  <dgm:constr type="b" for="ch" forName="descendantBox" refType="h" fact="0.98"/>
+                  <dgm:constr type="h" for="ch" forName="descendantBox" refType="h" fact="0.46"/>
+                </dgm:constrLst>
+              </dgm:if>
+              <dgm:else name="Name6">
+                <dgm:constrLst>
+                  <dgm:constr type="w" for="ch" forName="parentTextBox" refType="w"/>
+                  <dgm:constr type="h" for="ch" forName="parentTextBox" refType="h"/>
+                </dgm:constrLst>
+              </dgm:else>
+            </dgm:choose>
+            <dgm:ruleLst/>
+            <dgm:layoutNode name="parentTextBox">
+              <dgm:alg type="tx"/>
+              <dgm:choose name="Name7">
+                <dgm:if name="Name8" axis="ch" ptType="node" func="cnt" op="gte" val="1">
+                  <dgm:shape xmlns:r="http://schemas.openxmlformats.org/officeDocument/2006/relationships" type="rect" r:blip="" zOrderOff="1" hideGeom="1">
+                    <dgm:adjLst/>
+                  </dgm:shape>
+                </dgm:if>
+                <dgm:else name="Name9">
+                  <dgm:shape xmlns:r="http://schemas.openxmlformats.org/officeDocument/2006/relationships" type="rect" r:blip="">
+                    <dgm:adjLst/>
+                  </dgm:shape>
+                </dgm:else>
+              </dgm:choose>
+              <dgm:presOf axis="self"/>
               <dgm:constrLst/>
-              <dgm:ruleLst/>
-            </dgm:layoutNode>
-            <dgm:layoutNode name="TwoNodes_2">
-              <dgm:varLst>
-                <dgm:bulletEnabled val="1"/>
-              </dgm:varLst>
-              <dgm:alg type="sp"/>
-              <dgm:shape xmlns:r="http://schemas.openxmlformats.org/officeDocument/2006/relationships" type="roundRect" r:blip="">
-                <dgm:adjLst>
-                  <dgm:adj idx="1" val="0.1"/>
-                </dgm:adjLst>
-              </dgm:shape>
-              <dgm:presOf axis="ch desOrSelf" ptType="node node" st="2 1" cnt="1 0"/>
-              <dgm:constrLst/>
-              <dgm:ruleLst/>
-            </dgm:layoutNode>
-            <dgm:layoutNode name="TwoConn_1-2" styleLbl="fgAccFollowNode1">
-              <dgm:varLst>
-                <dgm:bulletEnabled val="1"/>
-              </dgm:varLst>
-              <dgm:alg type="tx"/>
-              <dgm:shape xmlns:r="http://schemas.openxmlformats.org/officeDocument/2006/relationships" type="downArrow" r:blip="">
-                <dgm:adjLst>
-                  <dgm:adj idx="1" val="0.55"/>
-                  <dgm:adj idx="2" val="0.45"/>
-                </dgm:adjLst>
-              </dgm:shape>
-              <dgm:presOf axis="ch" ptType="sibTrans" cnt="1"/>
-              <dgm:constrLst>
-                <dgm:constr type="lMarg" refType="primFontSz" fact="0.1"/>
-                <dgm:constr type="rMarg" refType="primFontSz" fact="0.1"/>
-                <dgm:constr type="tMarg" refType="primFontSz" fact="0.1"/>
-                <dgm:constr type="bMarg" refType="primFontSz" fact="0.1"/>
-              </dgm:constrLst>
               <dgm:ruleLst>
                 <dgm:rule type="primFontSz" val="5" fact="NaN" max="NaN"/>
               </dgm:ruleLst>
             </dgm:layoutNode>
-            <dgm:layoutNode name="TwoNodes_1_text">
-              <dgm:varLst>
-                <dgm:bulletEnabled val="1"/>
-              </dgm:varLst>
-              <dgm:alg type="tx">
-                <dgm:param type="parTxLTRAlign" val="l"/>
-                <dgm:param type="txAnchorVertCh" val="mid"/>
-              </dgm:alg>
-              <dgm:shape xmlns:r="http://schemas.openxmlformats.org/officeDocument/2006/relationships" type="roundRect" r:blip="" hideGeom="1">
-                <dgm:adjLst>
-                  <dgm:adj idx="1" val="0.1"/>
-                </dgm:adjLst>
-              </dgm:shape>
-              <dgm:presOf axis="ch desOrSelf" ptType="node node" st="1 1" cnt="1 0"/>
-              <dgm:constrLst>
-                <dgm:constr type="lMarg" refType="primFontSz" fact="0.3"/>
-                <dgm:constr type="rMarg" refType="primFontSz" fact="0.3"/>
-                <dgm:constr type="tMarg" refType="primFontSz" fact="0.3"/>
-                <dgm:constr type="bMarg" refType="primFontSz" fact="0.3"/>
-              </dgm:constrLst>
-              <dgm:ruleLst>
-                <dgm:rule type="primFontSz" val="5" fact="NaN" max="NaN"/>
-              </dgm:ruleLst>
-            </dgm:layoutNode>
-            <dgm:layoutNode name="TwoNodes_2_text">
-              <dgm:varLst>
-                <dgm:bulletEnabled val="1"/>
-              </dgm:varLst>
-              <dgm:alg type="tx">
-                <dgm:param type="parTxLTRAlign" val="l"/>
-                <dgm:param type="txAnchorVertCh" val="mid"/>
-              </dgm:alg>
-              <dgm:shape xmlns:r="http://schemas.openxmlformats.org/officeDocument/2006/relationships" type="roundRect" r:blip="" hideGeom="1">
-                <dgm:adjLst>
-                  <dgm:adj idx="1" val="0.1"/>
-                </dgm:adjLst>
-              </dgm:shape>
-              <dgm:presOf axis="ch desOrSelf" ptType="node node" st="2 1" cnt="1 0"/>
-              <dgm:constrLst>
-                <dgm:constr type="lMarg" refType="primFontSz" fact="0.3"/>
-                <dgm:constr type="rMarg" refType="primFontSz" fact="0.3"/>
-                <dgm:constr type="tMarg" refType="primFontSz" fact="0.3"/>
-                <dgm:constr type="bMarg" refType="primFontSz" fact="0.3"/>
-              </dgm:constrLst>
-              <dgm:ruleLst>
-                <dgm:rule type="primFontSz" val="5" fact="NaN" max="NaN"/>
-              </dgm:ruleLst>
-            </dgm:layoutNode>
-          </dgm:if>
-          <dgm:else name="Name8">
-            <dgm:choose name="Name9">
-              <dgm:if name="Name10" axis="ch" ptType="node" func="cnt" op="equ" val="3">
-                <dgm:layoutNode name="ThreeNodes_1">
-                  <dgm:varLst>
-                    <dgm:bulletEnabled val="1"/>
-                  </dgm:varLst>
+            <dgm:choose name="Name10">
+              <dgm:if name="Name11" axis="ch" ptType="node" func="cnt" op="gte" val="1">
+                <dgm:layoutNode name="entireBox">
                   <dgm:alg type="sp"/>
-                  <dgm:shape xmlns:r="http://schemas.openxmlformats.org/officeDocument/2006/relationships" type="roundRect" r:blip="">
-                    <dgm:adjLst>
-                      <dgm:adj idx="1" val="0.1"/>
-                    </dgm:adjLst>
+                  <dgm:shape xmlns:r="http://schemas.openxmlformats.org/officeDocument/2006/relationships" type="rect" r:blip="">
+                    <dgm:adjLst/>
                   </dgm:shape>
-                  <dgm:presOf axis="ch desOrSelf" ptType="node node" st="1 1" cnt="1 0"/>
+                  <dgm:presOf axis="self"/>
                   <dgm:constrLst/>
                   <dgm:ruleLst/>
                 </dgm:layoutNode>
-                <dgm:layoutNode name="ThreeNodes_2">
-                  <dgm:varLst>
-                    <dgm:bulletEnabled val="1"/>
-                  </dgm:varLst>
-                  <dgm:alg type="sp"/>
-                  <dgm:shape xmlns:r="http://schemas.openxmlformats.org/officeDocument/2006/relationships" type="roundRect" r:blip="">
-                    <dgm:adjLst>
-                      <dgm:adj idx="1" val="0.1"/>
-                    </dgm:adjLst>
+                <dgm:layoutNode name="descendantBox" styleLbl="fgAccFollowNode1">
+                  <dgm:choose name="Name12">
+                    <dgm:if name="Name13" func="var" arg="dir" op="equ" val="norm">
+                      <dgm:alg type="lin"/>
+                    </dgm:if>
+                    <dgm:else name="Name14">
+                      <dgm:alg type="lin">
+                        <dgm:param type="linDir" val="fromR"/>
+                      </dgm:alg>
+                    </dgm:else>
+                  </dgm:choose>
+                  <dgm:shape xmlns:r="http://schemas.openxmlformats.org/officeDocument/2006/relationships" r:blip="">
+                    <dgm:adjLst/>
                   </dgm:shape>
-                  <dgm:presOf axis="ch desOrSelf" ptType="node node" st="2 1" cnt="1 0"/>
-                  <dgm:constrLst/>
+                  <dgm:presOf/>
+                  <dgm:constrLst>
+                    <dgm:constr type="w" for="ch" forName="childTextBox" refType="w"/>
+                    <dgm:constr type="h" for="ch" forName="childTextBox" refType="h"/>
+                  </dgm:constrLst>
                   <dgm:ruleLst/>
-                </dgm:layoutNode>
-                <dgm:layoutNode name="ThreeNodes_3">
-                  <dgm:varLst>
-                    <dgm:bulletEnabled val="1"/>
-                  </dgm:varLst>
-                  <dgm:alg type="sp"/>
-                  <dgm:shape xmlns:r="http://schemas.openxmlformats.org/officeDocument/2006/relationships" type="roundRect" r:blip="">
-                    <dgm:adjLst>
-                      <dgm:adj idx="1" val="0.1"/>
-                    </dgm:adjLst>
-                  </dgm:shape>
-                  <dgm:presOf axis="ch desOrSelf" ptType="node node" st="3 1" cnt="1 0"/>
-                  <dgm:constrLst/>
-                  <dgm:ruleLst/>
-                </dgm:layoutNode>
-                <dgm:layoutNode name="ThreeConn_1-2" styleLbl="fgAccFollowNode1">
-                  <dgm:varLst>
-                    <dgm:bulletEnabled val="1"/>
-                  </dgm:varLst>
-                  <dgm:alg type="tx"/>
-                  <dgm:shape xmlns:r="http://schemas.openxmlformats.org/officeDocument/2006/relationships" type="downArrow" r:blip="">
-                    <dgm:adjLst>
-                      <dgm:adj idx="1" val="0.55"/>
-                      <dgm:adj idx="2" val="0.45"/>
-                    </dgm:adjLst>
-                  </dgm:shape>
-                  <dgm:presOf axis="ch" ptType="sibTrans" cnt="1"/>
-                  <dgm:constrLst>
-                    <dgm:constr type="lMarg" refType="primFontSz" fact="0.1"/>
-                    <dgm:constr type="rMarg" refType="primFontSz" fact="0.1"/>
-                    <dgm:constr type="tMarg" refType="primFontSz" fact="0.1"/>
-                    <dgm:constr type="bMarg" refType="primFontSz" fact="0.1"/>
-                  </dgm:constrLst>
-                  <dgm:ruleLst>
-                    <dgm:rule type="primFontSz" val="5" fact="NaN" max="NaN"/>
-                  </dgm:ruleLst>
-                </dgm:layoutNode>
-                <dgm:layoutNode name="ThreeConn_2-3" styleLbl="fgAccFollowNode1">
-                  <dgm:varLst>
-                    <dgm:bulletEnabled val="1"/>
-                  </dgm:varLst>
-                  <dgm:alg type="tx"/>
-                  <dgm:shape xmlns:r="http://schemas.openxmlformats.org/officeDocument/2006/relationships" type="downArrow" r:blip="">
-                    <dgm:adjLst>
-                      <dgm:adj idx="1" val="0.55"/>
-                      <dgm:adj idx="2" val="0.45"/>
-                    </dgm:adjLst>
-                  </dgm:shape>
-                  <dgm:presOf axis="ch" ptType="sibTrans" st="2" cnt="1"/>
-                  <dgm:constrLst>
-                    <dgm:constr type="lMarg" refType="primFontSz" fact="0.1"/>
-                    <dgm:constr type="rMarg" refType="primFontSz" fact="0.1"/>
-                    <dgm:constr type="tMarg" refType="primFontSz" fact="0.1"/>
-                    <dgm:constr type="bMarg" refType="primFontSz" fact="0.1"/>
-                  </dgm:constrLst>
-                  <dgm:ruleLst>
-                    <dgm:rule type="primFontSz" val="5" fact="NaN" max="NaN"/>
-                  </dgm:ruleLst>
-                </dgm:layoutNode>
-                <dgm:layoutNode name="ThreeNodes_1_text">
-                  <dgm:varLst>
-                    <dgm:bulletEnabled val="1"/>
-                  </dgm:varLst>
-                  <dgm:alg type="tx">
-                    <dgm:param type="parTxLTRAlign" val="l"/>
-                    <dgm:param type="txAnchorVertCh" val="mid"/>
-                  </dgm:alg>
-                  <dgm:shape xmlns:r="http://schemas.openxmlformats.org/officeDocument/2006/relationships" type="roundRect" r:blip="" hideGeom="1">
-                    <dgm:adjLst>
-                      <dgm:adj idx="1" val="0.1"/>
-                    </dgm:adjLst>
-                  </dgm:shape>
-                  <dgm:presOf axis="ch desOrSelf" ptType="node node" st="1 1" cnt="1 0"/>
-                  <dgm:constrLst>
-                    <dgm:constr type="lMarg" refType="primFontSz" fact="0.3"/>
-                    <dgm:constr type="rMarg" refType="primFontSz" fact="0.3"/>
-                    <dgm:constr type="tMarg" refType="primFontSz" fact="0.3"/>
-                    <dgm:constr type="bMarg" refType="primFontSz" fact="0.3"/>
-                  </dgm:constrLst>
-                  <dgm:ruleLst>
-                    <dgm:rule type="primFontSz" val="5" fact="NaN" max="NaN"/>
-                  </dgm:ruleLst>
-                </dgm:layoutNode>
-                <dgm:layoutNode name="ThreeNodes_2_text">
-                  <dgm:varLst>
-                    <dgm:bulletEnabled val="1"/>
-                  </dgm:varLst>
-                  <dgm:alg type="tx">
-                    <dgm:param type="parTxLTRAlign" val="l"/>
-                    <dgm:param type="txAnchorVertCh" val="mid"/>
-                  </dgm:alg>
-                  <dgm:shape xmlns:r="http://schemas.openxmlformats.org/officeDocument/2006/relationships" type="roundRect" r:blip="" hideGeom="1">
-                    <dgm:adjLst>
-                      <dgm:adj idx="1" val="0.1"/>
-                    </dgm:adjLst>
-                  </dgm:shape>
-                  <dgm:presOf axis="ch desOrSelf" ptType="node node" st="2 1" cnt="1 0"/>
-                  <dgm:constrLst>
-                    <dgm:constr type="lMarg" refType="primFontSz" fact="0.3"/>
-                    <dgm:constr type="rMarg" refType="primFontSz" fact="0.3"/>
-                    <dgm:constr type="tMarg" refType="primFontSz" fact="0.3"/>
-                    <dgm:constr type="bMarg" refType="primFontSz" fact="0.3"/>
-                  </dgm:constrLst>
-                  <dgm:ruleLst>
-                    <dgm:rule type="primFontSz" val="5" fact="NaN" max="NaN"/>
-                  </dgm:ruleLst>
-                </dgm:layoutNode>
-                <dgm:layoutNode name="ThreeNodes_3_text">
-                  <dgm:varLst>
-                    <dgm:bulletEnabled val="1"/>
-                  </dgm:varLst>
-                  <dgm:alg type="tx">
-                    <dgm:param type="parTxLTRAlign" val="l"/>
-                    <dgm:param type="txAnchorVertCh" val="mid"/>
-                  </dgm:alg>
-                  <dgm:shape xmlns:r="http://schemas.openxmlformats.org/officeDocument/2006/relationships" type="roundRect" r:blip="" hideGeom="1">
-                    <dgm:adjLst>
-                      <dgm:adj idx="1" val="0.1"/>
-                    </dgm:adjLst>
-                  </dgm:shape>
-                  <dgm:presOf axis="ch desOrSelf" ptType="node node" st="3 1" cnt="1 0"/>
-                  <dgm:constrLst>
-                    <dgm:constr type="lMarg" refType="primFontSz" fact="0.3"/>
-                    <dgm:constr type="rMarg" refType="primFontSz" fact="0.3"/>
-                    <dgm:constr type="tMarg" refType="primFontSz" fact="0.3"/>
-                    <dgm:constr type="bMarg" refType="primFontSz" fact="0.3"/>
-                  </dgm:constrLst>
-                  <dgm:ruleLst>
-                    <dgm:rule type="primFontSz" val="5" fact="NaN" max="NaN"/>
-                  </dgm:ruleLst>
-                </dgm:layoutNode>
-              </dgm:if>
-              <dgm:else name="Name11">
-                <dgm:choose name="Name12">
-                  <dgm:if name="Name13" axis="ch" ptType="node" func="cnt" op="equ" val="4">
-                    <dgm:layoutNode name="FourNodes_1">
-                      <dgm:varLst>
-                        <dgm:bulletEnabled val="1"/>
-                      </dgm:varLst>
-                      <dgm:alg type="sp"/>
-                      <dgm:shape xmlns:r="http://schemas.openxmlformats.org/officeDocument/2006/relationships" type="roundRect" r:blip="">
-                        <dgm:adjLst>
-                          <dgm:adj idx="1" val="0.1"/>
-                        </dgm:adjLst>
-                      </dgm:shape>
-                      <dgm:presOf axis="ch desOrSelf" ptType="node node" st="1 1" cnt="1 0"/>
-                      <dgm:constrLst/>
-                      <dgm:ruleLst/>
-                    </dgm:layoutNode>
-                    <dgm:layoutNode name="FourNodes_2">
-                      <dgm:varLst>
-                        <dgm:bulletEnabled val="1"/>
-                      </dgm:varLst>
-                      <dgm:alg type="sp"/>
-                      <dgm:shape xmlns:r="http://schemas.openxmlformats.org/officeDocument/2006/relationships" type="roundRect" r:blip="">
-                        <dgm:adjLst>
-                          <dgm:adj idx="1" val="0.1"/>
-                        </dgm:adjLst>
-                      </dgm:shape>
-                      <dgm:presOf axis="ch desOrSelf" ptType="node node" st="2 1" cnt="1 0"/>
-                      <dgm:constrLst/>
-                      <dgm:ruleLst/>
-                    </dgm:layoutNode>
-                    <dgm:layoutNode name="FourNodes_3">
-                      <dgm:varLst>
-                        <dgm:bulletEnabled val="1"/>
-                      </dgm:varLst>
-                      <dgm:alg type="sp"/>
-                      <dgm:shape xmlns:r="http://schemas.openxmlformats.org/officeDocument/2006/relationships" type="roundRect" r:blip="">
-                        <dgm:adjLst>
-                          <dgm:adj idx="1" val="0.1"/>
-                        </dgm:adjLst>
-                      </dgm:shape>
-                      <dgm:presOf axis="ch desOrSelf" ptType="node node" st="3 1" cnt="1 0"/>
-                      <dgm:constrLst/>
-                      <dgm:ruleLst/>
-                    </dgm:layoutNode>
-                    <dgm:layoutNode name="FourNodes_4">
-                      <dgm:varLst>
-                        <dgm:bulletEnabled val="1"/>
-                      </dgm:varLst>
-                      <dgm:alg type="sp"/>
-                      <dgm:shape xmlns:r="http://schemas.openxmlformats.org/officeDocument/2006/relationships" type="roundRect" r:blip="">
-                        <dgm:adjLst>
-                          <dgm:adj idx="1" val="0.1"/>
-                        </dgm:adjLst>
-                      </dgm:shape>
-                      <dgm:presOf axis="ch desOrSelf" ptType="node node" st="4 1" cnt="1 0"/>
-                      <dgm:constrLst/>
-                      <dgm:ruleLst/>
-                    </dgm:layoutNode>
-                    <dgm:layoutNode name="FourConn_1-2" styleLbl="fgAccFollowNode1">
+                  <dgm:forEach name="Name15" axis="ch" ptType="node">
+                    <dgm:layoutNode name="childTextBox" styleLbl="fgAccFollowNode1">
                       <dgm:varLst>
                         <dgm:bulletEnabled val="1"/>
                       </dgm:varLst>
                       <dgm:alg type="tx"/>
-                      <dgm:shape xmlns:r="http://schemas.openxmlformats.org/officeDocument/2006/relationships" type="downArrow" r:blip="">
-                        <dgm:adjLst>
-                          <dgm:adj idx="1" val="0.55"/>
-                          <dgm:adj idx="2" val="0.45"/>
-                        </dgm:adjLst>
+                      <dgm:shape xmlns:r="http://schemas.openxmlformats.org/officeDocument/2006/relationships" type="rect" r:blip="">
+                        <dgm:adjLst/>
                       </dgm:shape>
-                      <dgm:presOf axis="ch" ptType="sibTrans" cnt="1"/>
+                      <dgm:presOf axis="desOrSelf" ptType="node"/>
                       <dgm:constrLst>
-                        <dgm:constr type="lMarg" refType="primFontSz" fact="0.1"/>
-                        <dgm:constr type="rMarg" refType="primFontSz" fact="0.1"/>
                         <dgm:constr type="tMarg" refType="primFontSz" fact="0.1"/>
                         <dgm:constr type="bMarg" refType="primFontSz" fact="0.1"/>
                       </dgm:constrLst>
@@ -2374,21 +1624,103 @@
                         <dgm:rule type="primFontSz" val="5" fact="NaN" max="NaN"/>
                       </dgm:ruleLst>
                     </dgm:layoutNode>
-                    <dgm:layoutNode name="FourConn_2-3" styleLbl="fgAccFollowNode1">
+                  </dgm:forEach>
+                </dgm:layoutNode>
+              </dgm:if>
+              <dgm:else name="Name16"/>
+            </dgm:choose>
+          </dgm:layoutNode>
+        </dgm:if>
+        <dgm:else name="Name17">
+          <dgm:layoutNode name="arrowAndChildren">
+            <dgm:alg type="composite"/>
+            <dgm:shape xmlns:r="http://schemas.openxmlformats.org/officeDocument/2006/relationships" r:blip="">
+              <dgm:adjLst/>
+            </dgm:shape>
+            <dgm:presOf/>
+            <dgm:choose name="Name18">
+              <dgm:if name="Name19" axis="ch" ptType="node" func="cnt" op="gte" val="1">
+                <dgm:constrLst>
+                  <dgm:constr type="w" for="ch" forName="parentTextArrow" refType="w"/>
+                  <dgm:constr type="t" for="ch" forName="parentTextArrow"/>
+                  <dgm:constr type="h" for="ch" forName="parentTextArrow" refType="h" fact="0.351"/>
+                  <dgm:constr type="w" for="ch" forName="arrow" refType="w"/>
+                  <dgm:constr type="h" for="ch" forName="arrow" refType="h"/>
+                  <dgm:constr type="w" for="ch" forName="descendantArrow" refType="w"/>
+                  <dgm:constr type="b" for="ch" forName="descendantArrow" refType="h" fact="0.65"/>
+                  <dgm:constr type="h" for="ch" forName="descendantArrow" refType="h" fact="0.299"/>
+                </dgm:constrLst>
+              </dgm:if>
+              <dgm:else name="Name20">
+                <dgm:constrLst>
+                  <dgm:constr type="w" for="ch" forName="parentTextArrow" refType="w"/>
+                  <dgm:constr type="h" for="ch" forName="parentTextArrow" refType="h"/>
+                </dgm:constrLst>
+              </dgm:else>
+            </dgm:choose>
+            <dgm:ruleLst/>
+            <dgm:layoutNode name="parentTextArrow">
+              <dgm:alg type="tx"/>
+              <dgm:choose name="Name21">
+                <dgm:if name="Name22" axis="ch" ptType="node" func="cnt" op="gte" val="1">
+                  <dgm:shape xmlns:r="http://schemas.openxmlformats.org/officeDocument/2006/relationships" type="rect" r:blip="" zOrderOff="1" hideGeom="1">
+                    <dgm:adjLst/>
+                  </dgm:shape>
+                </dgm:if>
+                <dgm:else name="Name23">
+                  <dgm:shape xmlns:r="http://schemas.openxmlformats.org/officeDocument/2006/relationships" rot="180" type="upArrowCallout" r:blip="">
+                    <dgm:adjLst/>
+                  </dgm:shape>
+                </dgm:else>
+              </dgm:choose>
+              <dgm:presOf axis="self"/>
+              <dgm:constrLst/>
+              <dgm:ruleLst>
+                <dgm:rule type="primFontSz" val="5" fact="NaN" max="NaN"/>
+              </dgm:ruleLst>
+            </dgm:layoutNode>
+            <dgm:choose name="Name24">
+              <dgm:if name="Name25" axis="ch" ptType="node" func="cnt" op="gte" val="1">
+                <dgm:layoutNode name="arrow">
+                  <dgm:alg type="sp"/>
+                  <dgm:shape xmlns:r="http://schemas.openxmlformats.org/officeDocument/2006/relationships" rot="180" type="upArrowCallout" r:blip="">
+                    <dgm:adjLst/>
+                  </dgm:shape>
+                  <dgm:presOf axis="self"/>
+                  <dgm:constrLst/>
+                  <dgm:ruleLst/>
+                </dgm:layoutNode>
+                <dgm:layoutNode name="descendantArrow">
+                  <dgm:choose name="Name26">
+                    <dgm:if name="Name27" func="var" arg="dir" op="equ" val="norm">
+                      <dgm:alg type="lin"/>
+                    </dgm:if>
+                    <dgm:else name="Name28">
+                      <dgm:alg type="lin">
+                        <dgm:param type="linDir" val="fromR"/>
+                      </dgm:alg>
+                    </dgm:else>
+                  </dgm:choose>
+                  <dgm:shape xmlns:r="http://schemas.openxmlformats.org/officeDocument/2006/relationships" r:blip="">
+                    <dgm:adjLst/>
+                  </dgm:shape>
+                  <dgm:presOf/>
+                  <dgm:constrLst>
+                    <dgm:constr type="w" for="ch" forName="childTextArrow" refType="w"/>
+                    <dgm:constr type="h" for="ch" forName="childTextArrow" refType="h"/>
+                  </dgm:constrLst>
+                  <dgm:ruleLst/>
+                  <dgm:forEach name="Name29" axis="ch" ptType="node">
+                    <dgm:layoutNode name="childTextArrow" styleLbl="fgAccFollowNode1">
                       <dgm:varLst>
                         <dgm:bulletEnabled val="1"/>
                       </dgm:varLst>
                       <dgm:alg type="tx"/>
-                      <dgm:shape xmlns:r="http://schemas.openxmlformats.org/officeDocument/2006/relationships" type="downArrow" r:blip="">
-                        <dgm:adjLst>
-                          <dgm:adj idx="1" val="0.55"/>
-                          <dgm:adj idx="2" val="0.45"/>
-                        </dgm:adjLst>
+                      <dgm:shape xmlns:r="http://schemas.openxmlformats.org/officeDocument/2006/relationships" type="rect" r:blip="">
+                        <dgm:adjLst/>
                       </dgm:shape>
-                      <dgm:presOf axis="ch" ptType="sibTrans" st="2" cnt="1"/>
+                      <dgm:presOf axis="desOrSelf" ptType="node"/>
                       <dgm:constrLst>
-                        <dgm:constr type="lMarg" refType="primFontSz" fact="0.1"/>
-                        <dgm:constr type="rMarg" refType="primFontSz" fact="0.1"/>
                         <dgm:constr type="tMarg" refType="primFontSz" fact="0.1"/>
                         <dgm:constr type="bMarg" refType="primFontSz" fact="0.1"/>
                       </dgm:constrLst>
@@ -2396,417 +1728,26 @@
                         <dgm:rule type="primFontSz" val="5" fact="NaN" max="NaN"/>
                       </dgm:ruleLst>
                     </dgm:layoutNode>
-                    <dgm:layoutNode name="FourConn_3-4" styleLbl="fgAccFollowNode1">
-                      <dgm:varLst>
-                        <dgm:bulletEnabled val="1"/>
-                      </dgm:varLst>
-                      <dgm:alg type="tx"/>
-                      <dgm:shape xmlns:r="http://schemas.openxmlformats.org/officeDocument/2006/relationships" type="downArrow" r:blip="">
-                        <dgm:adjLst>
-                          <dgm:adj idx="1" val="0.55"/>
-                          <dgm:adj idx="2" val="0.45"/>
-                        </dgm:adjLst>
-                      </dgm:shape>
-                      <dgm:presOf axis="ch" ptType="sibTrans" st="3" cnt="1"/>
-                      <dgm:constrLst>
-                        <dgm:constr type="lMarg" refType="primFontSz" fact="0.1"/>
-                        <dgm:constr type="rMarg" refType="primFontSz" fact="0.1"/>
-                        <dgm:constr type="tMarg" refType="primFontSz" fact="0.1"/>
-                        <dgm:constr type="bMarg" refType="primFontSz" fact="0.1"/>
-                      </dgm:constrLst>
-                      <dgm:ruleLst>
-                        <dgm:rule type="primFontSz" val="5" fact="NaN" max="NaN"/>
-                      </dgm:ruleLst>
-                    </dgm:layoutNode>
-                    <dgm:layoutNode name="FourNodes_1_text">
-                      <dgm:varLst>
-                        <dgm:bulletEnabled val="1"/>
-                      </dgm:varLst>
-                      <dgm:alg type="tx">
-                        <dgm:param type="parTxLTRAlign" val="l"/>
-                        <dgm:param type="txAnchorVertCh" val="mid"/>
-                      </dgm:alg>
-                      <dgm:shape xmlns:r="http://schemas.openxmlformats.org/officeDocument/2006/relationships" type="roundRect" r:blip="" hideGeom="1">
-                        <dgm:adjLst>
-                          <dgm:adj idx="1" val="0.1"/>
-                        </dgm:adjLst>
-                      </dgm:shape>
-                      <dgm:presOf axis="ch desOrSelf" ptType="node node" st="1 1" cnt="1 0"/>
-                      <dgm:constrLst>
-                        <dgm:constr type="lMarg" refType="primFontSz" fact="0.3"/>
-                        <dgm:constr type="rMarg" refType="primFontSz" fact="0.3"/>
-                        <dgm:constr type="tMarg" refType="primFontSz" fact="0.3"/>
-                        <dgm:constr type="bMarg" refType="primFontSz" fact="0.3"/>
-                      </dgm:constrLst>
-                      <dgm:ruleLst>
-                        <dgm:rule type="primFontSz" val="5" fact="NaN" max="NaN"/>
-                      </dgm:ruleLst>
-                    </dgm:layoutNode>
-                    <dgm:layoutNode name="FourNodes_2_text">
-                      <dgm:varLst>
-                        <dgm:bulletEnabled val="1"/>
-                      </dgm:varLst>
-                      <dgm:alg type="tx">
-                        <dgm:param type="parTxLTRAlign" val="l"/>
-                        <dgm:param type="txAnchorVertCh" val="mid"/>
-                      </dgm:alg>
-                      <dgm:shape xmlns:r="http://schemas.openxmlformats.org/officeDocument/2006/relationships" type="roundRect" r:blip="" hideGeom="1">
-                        <dgm:adjLst>
-                          <dgm:adj idx="1" val="0.1"/>
-                        </dgm:adjLst>
-                      </dgm:shape>
-                      <dgm:presOf axis="ch desOrSelf" ptType="node node" st="2 1" cnt="1 0"/>
-                      <dgm:constrLst>
-                        <dgm:constr type="lMarg" refType="primFontSz" fact="0.3"/>
-                        <dgm:constr type="rMarg" refType="primFontSz" fact="0.3"/>
-                        <dgm:constr type="tMarg" refType="primFontSz" fact="0.3"/>
-                        <dgm:constr type="bMarg" refType="primFontSz" fact="0.3"/>
-                      </dgm:constrLst>
-                      <dgm:ruleLst>
-                        <dgm:rule type="primFontSz" val="5" fact="NaN" max="NaN"/>
-                      </dgm:ruleLst>
-                    </dgm:layoutNode>
-                    <dgm:layoutNode name="FourNodes_3_text">
-                      <dgm:varLst>
-                        <dgm:bulletEnabled val="1"/>
-                      </dgm:varLst>
-                      <dgm:alg type="tx">
-                        <dgm:param type="parTxLTRAlign" val="l"/>
-                        <dgm:param type="txAnchorVertCh" val="mid"/>
-                      </dgm:alg>
-                      <dgm:shape xmlns:r="http://schemas.openxmlformats.org/officeDocument/2006/relationships" type="roundRect" r:blip="" hideGeom="1">
-                        <dgm:adjLst>
-                          <dgm:adj idx="1" val="0.1"/>
-                        </dgm:adjLst>
-                      </dgm:shape>
-                      <dgm:presOf axis="ch desOrSelf" ptType="node node" st="3 1" cnt="1 0"/>
-                      <dgm:constrLst>
-                        <dgm:constr type="lMarg" refType="primFontSz" fact="0.3"/>
-                        <dgm:constr type="rMarg" refType="primFontSz" fact="0.3"/>
-                        <dgm:constr type="tMarg" refType="primFontSz" fact="0.3"/>
-                        <dgm:constr type="bMarg" refType="primFontSz" fact="0.3"/>
-                      </dgm:constrLst>
-                      <dgm:ruleLst>
-                        <dgm:rule type="primFontSz" val="5" fact="NaN" max="NaN"/>
-                      </dgm:ruleLst>
-                    </dgm:layoutNode>
-                    <dgm:layoutNode name="FourNodes_4_text">
-                      <dgm:varLst>
-                        <dgm:bulletEnabled val="1"/>
-                      </dgm:varLst>
-                      <dgm:alg type="tx">
-                        <dgm:param type="parTxLTRAlign" val="l"/>
-                        <dgm:param type="txAnchorVertCh" val="mid"/>
-                      </dgm:alg>
-                      <dgm:shape xmlns:r="http://schemas.openxmlformats.org/officeDocument/2006/relationships" type="roundRect" r:blip="" hideGeom="1">
-                        <dgm:adjLst>
-                          <dgm:adj idx="1" val="0.1"/>
-                        </dgm:adjLst>
-                      </dgm:shape>
-                      <dgm:presOf axis="ch desOrSelf" ptType="node node" st="4 1" cnt="1 0"/>
-                      <dgm:constrLst>
-                        <dgm:constr type="lMarg" refType="primFontSz" fact="0.3"/>
-                        <dgm:constr type="rMarg" refType="primFontSz" fact="0.3"/>
-                        <dgm:constr type="tMarg" refType="primFontSz" fact="0.3"/>
-                        <dgm:constr type="bMarg" refType="primFontSz" fact="0.3"/>
-                      </dgm:constrLst>
-                      <dgm:ruleLst>
-                        <dgm:rule type="primFontSz" val="5" fact="NaN" max="NaN"/>
-                      </dgm:ruleLst>
-                    </dgm:layoutNode>
-                  </dgm:if>
-                  <dgm:else name="Name14">
-                    <dgm:choose name="Name15">
-                      <dgm:if name="Name16" axis="ch" ptType="node" func="cnt" op="gte" val="5">
-                        <dgm:layoutNode name="FiveNodes_1">
-                          <dgm:varLst>
-                            <dgm:bulletEnabled val="1"/>
-                          </dgm:varLst>
-                          <dgm:alg type="sp"/>
-                          <dgm:shape xmlns:r="http://schemas.openxmlformats.org/officeDocument/2006/relationships" type="roundRect" r:blip="">
-                            <dgm:adjLst>
-                              <dgm:adj idx="1" val="0.1"/>
-                            </dgm:adjLst>
-                          </dgm:shape>
-                          <dgm:presOf axis="ch desOrSelf" ptType="node node" st="1 1" cnt="1 0"/>
-                          <dgm:constrLst/>
-                          <dgm:ruleLst/>
-                        </dgm:layoutNode>
-                        <dgm:layoutNode name="FiveNodes_2">
-                          <dgm:varLst>
-                            <dgm:bulletEnabled val="1"/>
-                          </dgm:varLst>
-                          <dgm:alg type="sp"/>
-                          <dgm:shape xmlns:r="http://schemas.openxmlformats.org/officeDocument/2006/relationships" type="roundRect" r:blip="">
-                            <dgm:adjLst>
-                              <dgm:adj idx="1" val="0.1"/>
-                            </dgm:adjLst>
-                          </dgm:shape>
-                          <dgm:presOf axis="ch desOrSelf" ptType="node node" st="2 1" cnt="1 0"/>
-                          <dgm:constrLst/>
-                          <dgm:ruleLst/>
-                        </dgm:layoutNode>
-                        <dgm:layoutNode name="FiveNodes_3">
-                          <dgm:varLst>
-                            <dgm:bulletEnabled val="1"/>
-                          </dgm:varLst>
-                          <dgm:alg type="sp"/>
-                          <dgm:shape xmlns:r="http://schemas.openxmlformats.org/officeDocument/2006/relationships" type="roundRect" r:blip="">
-                            <dgm:adjLst>
-                              <dgm:adj idx="1" val="0.1"/>
-                            </dgm:adjLst>
-                          </dgm:shape>
-                          <dgm:presOf axis="ch desOrSelf" ptType="node node" st="3 1" cnt="1 0"/>
-                          <dgm:constrLst/>
-                          <dgm:ruleLst/>
-                        </dgm:layoutNode>
-                        <dgm:layoutNode name="FiveNodes_4">
-                          <dgm:varLst>
-                            <dgm:bulletEnabled val="1"/>
-                          </dgm:varLst>
-                          <dgm:alg type="sp"/>
-                          <dgm:shape xmlns:r="http://schemas.openxmlformats.org/officeDocument/2006/relationships" type="roundRect" r:blip="">
-                            <dgm:adjLst>
-                              <dgm:adj idx="1" val="0.1"/>
-                            </dgm:adjLst>
-                          </dgm:shape>
-                          <dgm:presOf axis="ch desOrSelf" ptType="node node" st="4 1" cnt="1 0"/>
-                          <dgm:constrLst/>
-                          <dgm:ruleLst/>
-                        </dgm:layoutNode>
-                        <dgm:layoutNode name="FiveNodes_5">
-                          <dgm:varLst>
-                            <dgm:bulletEnabled val="1"/>
-                          </dgm:varLst>
-                          <dgm:alg type="sp"/>
-                          <dgm:shape xmlns:r="http://schemas.openxmlformats.org/officeDocument/2006/relationships" type="roundRect" r:blip="">
-                            <dgm:adjLst>
-                              <dgm:adj idx="1" val="0.1"/>
-                            </dgm:adjLst>
-                          </dgm:shape>
-                          <dgm:presOf axis="ch desOrSelf" ptType="node node" st="5 1" cnt="1 0"/>
-                          <dgm:constrLst/>
-                          <dgm:ruleLst/>
-                        </dgm:layoutNode>
-                        <dgm:layoutNode name="FiveConn_1-2" styleLbl="fgAccFollowNode1">
-                          <dgm:varLst>
-                            <dgm:bulletEnabled val="1"/>
-                          </dgm:varLst>
-                          <dgm:alg type="tx"/>
-                          <dgm:shape xmlns:r="http://schemas.openxmlformats.org/officeDocument/2006/relationships" type="downArrow" r:blip="">
-                            <dgm:adjLst>
-                              <dgm:adj idx="1" val="0.55"/>
-                              <dgm:adj idx="2" val="0.45"/>
-                            </dgm:adjLst>
-                          </dgm:shape>
-                          <dgm:presOf axis="ch" ptType="sibTrans" cnt="1"/>
-                          <dgm:constrLst>
-                            <dgm:constr type="lMarg" refType="primFontSz" fact="0.1"/>
-                            <dgm:constr type="rMarg" refType="primFontSz" fact="0.1"/>
-                            <dgm:constr type="tMarg" refType="primFontSz" fact="0.1"/>
-                            <dgm:constr type="bMarg" refType="primFontSz" fact="0.1"/>
-                          </dgm:constrLst>
-                          <dgm:ruleLst>
-                            <dgm:rule type="primFontSz" val="5" fact="NaN" max="NaN"/>
-                          </dgm:ruleLst>
-                        </dgm:layoutNode>
-                        <dgm:layoutNode name="FiveConn_2-3" styleLbl="fgAccFollowNode1">
-                          <dgm:varLst>
-                            <dgm:bulletEnabled val="1"/>
-                          </dgm:varLst>
-                          <dgm:alg type="tx"/>
-                          <dgm:shape xmlns:r="http://schemas.openxmlformats.org/officeDocument/2006/relationships" type="downArrow" r:blip="">
-                            <dgm:adjLst>
-                              <dgm:adj idx="1" val="0.55"/>
-                              <dgm:adj idx="2" val="0.45"/>
-                            </dgm:adjLst>
-                          </dgm:shape>
-                          <dgm:presOf axis="ch" ptType="sibTrans" st="2" cnt="1"/>
-                          <dgm:constrLst>
-                            <dgm:constr type="lMarg" refType="primFontSz" fact="0.1"/>
-                            <dgm:constr type="rMarg" refType="primFontSz" fact="0.1"/>
-                            <dgm:constr type="tMarg" refType="primFontSz" fact="0.1"/>
-                            <dgm:constr type="bMarg" refType="primFontSz" fact="0.1"/>
-                          </dgm:constrLst>
-                          <dgm:ruleLst>
-                            <dgm:rule type="primFontSz" val="5" fact="NaN" max="NaN"/>
-                          </dgm:ruleLst>
-                        </dgm:layoutNode>
-                        <dgm:layoutNode name="FiveConn_3-4" styleLbl="fgAccFollowNode1">
-                          <dgm:varLst>
-                            <dgm:bulletEnabled val="1"/>
-                          </dgm:varLst>
-                          <dgm:alg type="tx"/>
-                          <dgm:shape xmlns:r="http://schemas.openxmlformats.org/officeDocument/2006/relationships" type="downArrow" r:blip="">
-                            <dgm:adjLst>
-                              <dgm:adj idx="1" val="0.55"/>
-                              <dgm:adj idx="2" val="0.45"/>
-                            </dgm:adjLst>
-                          </dgm:shape>
-                          <dgm:presOf axis="ch" ptType="sibTrans" st="3" cnt="1"/>
-                          <dgm:constrLst>
-                            <dgm:constr type="lMarg" refType="primFontSz" fact="0.1"/>
-                            <dgm:constr type="rMarg" refType="primFontSz" fact="0.1"/>
-                            <dgm:constr type="tMarg" refType="primFontSz" fact="0.1"/>
-                            <dgm:constr type="bMarg" refType="primFontSz" fact="0.1"/>
-                          </dgm:constrLst>
-                          <dgm:ruleLst>
-                            <dgm:rule type="primFontSz" val="5" fact="NaN" max="NaN"/>
-                          </dgm:ruleLst>
-                        </dgm:layoutNode>
-                        <dgm:layoutNode name="FiveConn_4-5" styleLbl="fgAccFollowNode1">
-                          <dgm:varLst>
-                            <dgm:bulletEnabled val="1"/>
-                          </dgm:varLst>
-                          <dgm:alg type="tx"/>
-                          <dgm:shape xmlns:r="http://schemas.openxmlformats.org/officeDocument/2006/relationships" type="downArrow" r:blip="">
-                            <dgm:adjLst>
-                              <dgm:adj idx="1" val="0.55"/>
-                              <dgm:adj idx="2" val="0.45"/>
-                            </dgm:adjLst>
-                          </dgm:shape>
-                          <dgm:presOf axis="ch" ptType="sibTrans" st="4" cnt="1"/>
-                          <dgm:constrLst>
-                            <dgm:constr type="lMarg" refType="primFontSz" fact="0.1"/>
-                            <dgm:constr type="rMarg" refType="primFontSz" fact="0.1"/>
-                            <dgm:constr type="tMarg" refType="primFontSz" fact="0.1"/>
-                            <dgm:constr type="bMarg" refType="primFontSz" fact="0.1"/>
-                          </dgm:constrLst>
-                          <dgm:ruleLst>
-                            <dgm:rule type="primFontSz" val="5" fact="NaN" max="NaN"/>
-                          </dgm:ruleLst>
-                        </dgm:layoutNode>
-                        <dgm:layoutNode name="FiveNodes_1_text">
-                          <dgm:varLst>
-                            <dgm:bulletEnabled val="1"/>
-                          </dgm:varLst>
-                          <dgm:alg type="tx">
-                            <dgm:param type="parTxLTRAlign" val="l"/>
-                            <dgm:param type="txAnchorVertCh" val="mid"/>
-                          </dgm:alg>
-                          <dgm:shape xmlns:r="http://schemas.openxmlformats.org/officeDocument/2006/relationships" type="roundRect" r:blip="" hideGeom="1">
-                            <dgm:adjLst>
-                              <dgm:adj idx="1" val="0.1"/>
-                            </dgm:adjLst>
-                          </dgm:shape>
-                          <dgm:presOf axis="ch desOrSelf" ptType="node node" st="1 1" cnt="1 0"/>
-                          <dgm:constrLst>
-                            <dgm:constr type="lMarg" refType="primFontSz" fact="0.3"/>
-                            <dgm:constr type="rMarg" refType="primFontSz" fact="0.3"/>
-                            <dgm:constr type="tMarg" refType="primFontSz" fact="0.3"/>
-                            <dgm:constr type="bMarg" refType="primFontSz" fact="0.3"/>
-                          </dgm:constrLst>
-                          <dgm:ruleLst>
-                            <dgm:rule type="primFontSz" val="5" fact="NaN" max="NaN"/>
-                          </dgm:ruleLst>
-                        </dgm:layoutNode>
-                        <dgm:layoutNode name="FiveNodes_2_text">
-                          <dgm:varLst>
-                            <dgm:bulletEnabled val="1"/>
-                          </dgm:varLst>
-                          <dgm:alg type="tx">
-                            <dgm:param type="parTxLTRAlign" val="l"/>
-                            <dgm:param type="txAnchorVertCh" val="mid"/>
-                          </dgm:alg>
-                          <dgm:shape xmlns:r="http://schemas.openxmlformats.org/officeDocument/2006/relationships" type="roundRect" r:blip="" hideGeom="1">
-                            <dgm:adjLst>
-                              <dgm:adj idx="1" val="0.1"/>
-                            </dgm:adjLst>
-                          </dgm:shape>
-                          <dgm:presOf axis="ch desOrSelf" ptType="node node" st="2 1" cnt="1 0"/>
-                          <dgm:constrLst>
-                            <dgm:constr type="lMarg" refType="primFontSz" fact="0.3"/>
-                            <dgm:constr type="rMarg" refType="primFontSz" fact="0.3"/>
-                            <dgm:constr type="tMarg" refType="primFontSz" fact="0.3"/>
-                            <dgm:constr type="bMarg" refType="primFontSz" fact="0.3"/>
-                          </dgm:constrLst>
-                          <dgm:ruleLst>
-                            <dgm:rule type="primFontSz" val="5" fact="NaN" max="NaN"/>
-                          </dgm:ruleLst>
-                        </dgm:layoutNode>
-                        <dgm:layoutNode name="FiveNodes_3_text">
-                          <dgm:varLst>
-                            <dgm:bulletEnabled val="1"/>
-                          </dgm:varLst>
-                          <dgm:alg type="tx">
-                            <dgm:param type="parTxLTRAlign" val="l"/>
-                            <dgm:param type="txAnchorVertCh" val="mid"/>
-                          </dgm:alg>
-                          <dgm:shape xmlns:r="http://schemas.openxmlformats.org/officeDocument/2006/relationships" type="roundRect" r:blip="" hideGeom="1">
-                            <dgm:adjLst>
-                              <dgm:adj idx="1" val="0.1"/>
-                            </dgm:adjLst>
-                          </dgm:shape>
-                          <dgm:presOf axis="ch desOrSelf" ptType="node node" st="3 1" cnt="1 0"/>
-                          <dgm:constrLst>
-                            <dgm:constr type="lMarg" refType="primFontSz" fact="0.3"/>
-                            <dgm:constr type="rMarg" refType="primFontSz" fact="0.3"/>
-                            <dgm:constr type="tMarg" refType="primFontSz" fact="0.3"/>
-                            <dgm:constr type="bMarg" refType="primFontSz" fact="0.3"/>
-                          </dgm:constrLst>
-                          <dgm:ruleLst>
-                            <dgm:rule type="primFontSz" val="5" fact="NaN" max="NaN"/>
-                          </dgm:ruleLst>
-                        </dgm:layoutNode>
-                        <dgm:layoutNode name="FiveNodes_4_text">
-                          <dgm:varLst>
-                            <dgm:bulletEnabled val="1"/>
-                          </dgm:varLst>
-                          <dgm:alg type="tx">
-                            <dgm:param type="parTxLTRAlign" val="l"/>
-                            <dgm:param type="txAnchorVertCh" val="mid"/>
-                          </dgm:alg>
-                          <dgm:shape xmlns:r="http://schemas.openxmlformats.org/officeDocument/2006/relationships" type="roundRect" r:blip="" hideGeom="1">
-                            <dgm:adjLst>
-                              <dgm:adj idx="1" val="0.1"/>
-                            </dgm:adjLst>
-                          </dgm:shape>
-                          <dgm:presOf axis="ch desOrSelf" ptType="node node" st="4 1" cnt="1 0"/>
-                          <dgm:constrLst>
-                            <dgm:constr type="lMarg" refType="primFontSz" fact="0.3"/>
-                            <dgm:constr type="rMarg" refType="primFontSz" fact="0.3"/>
-                            <dgm:constr type="tMarg" refType="primFontSz" fact="0.3"/>
-                            <dgm:constr type="bMarg" refType="primFontSz" fact="0.3"/>
-                          </dgm:constrLst>
-                          <dgm:ruleLst>
-                            <dgm:rule type="primFontSz" val="5" fact="NaN" max="NaN"/>
-                          </dgm:ruleLst>
-                        </dgm:layoutNode>
-                        <dgm:layoutNode name="FiveNodes_5_text">
-                          <dgm:varLst>
-                            <dgm:bulletEnabled val="1"/>
-                          </dgm:varLst>
-                          <dgm:alg type="tx">
-                            <dgm:param type="parTxLTRAlign" val="l"/>
-                            <dgm:param type="txAnchorVertCh" val="mid"/>
-                          </dgm:alg>
-                          <dgm:shape xmlns:r="http://schemas.openxmlformats.org/officeDocument/2006/relationships" type="roundRect" r:blip="" hideGeom="1">
-                            <dgm:adjLst>
-                              <dgm:adj idx="1" val="0.1"/>
-                            </dgm:adjLst>
-                          </dgm:shape>
-                          <dgm:presOf axis="ch desOrSelf" ptType="node node" st="5 1" cnt="1 0"/>
-                          <dgm:constrLst>
-                            <dgm:constr type="lMarg" refType="primFontSz" fact="0.3"/>
-                            <dgm:constr type="rMarg" refType="primFontSz" fact="0.3"/>
-                            <dgm:constr type="tMarg" refType="primFontSz" fact="0.3"/>
-                            <dgm:constr type="bMarg" refType="primFontSz" fact="0.3"/>
-                          </dgm:constrLst>
-                          <dgm:ruleLst>
-                            <dgm:rule type="primFontSz" val="5" fact="NaN" max="NaN"/>
-                          </dgm:ruleLst>
-                        </dgm:layoutNode>
-                      </dgm:if>
-                      <dgm:else name="Name17"/>
-                    </dgm:choose>
-                  </dgm:else>
-                </dgm:choose>
-              </dgm:else>
+                  </dgm:forEach>
+                </dgm:layoutNode>
+              </dgm:if>
+              <dgm:else name="Name30"/>
             </dgm:choose>
-          </dgm:else>
-        </dgm:choose>
-      </dgm:else>
-    </dgm:choose>
+          </dgm:layoutNode>
+        </dgm:else>
+      </dgm:choose>
+      <dgm:forEach name="Name31" axis="precedSib" ptType="sibTrans" st="-1" cnt="1">
+        <dgm:layoutNode name="sp">
+          <dgm:alg type="sp"/>
+          <dgm:shape xmlns:r="http://schemas.openxmlformats.org/officeDocument/2006/relationships" r:blip="">
+            <dgm:adjLst/>
+          </dgm:shape>
+          <dgm:presOf axis="self"/>
+          <dgm:constrLst/>
+          <dgm:ruleLst/>
+        </dgm:layoutNode>
+      </dgm:forEach>
+    </dgm:forEach>
   </dgm:layoutNode>
 </dgm:layoutDef>
 </file>
@@ -4311,7 +3252,7 @@
             <a:fld id="{87DE6118-2437-4B30-8E3C-4D2BE6020583}" type="datetimeFigureOut">
               <a:rPr lang="en-US" dirty="0"/>
               <a:pPr/>
-              <a:t>3/23/2021</a:t>
+              <a:t>3/24/2021</a:t>
             </a:fld>
             <a:endParaRPr lang="en-US" dirty="0"/>
           </a:p>
@@ -4637,7 +3578,7 @@
           <a:p>
             <a:fld id="{87DE6118-2437-4B30-8E3C-4D2BE6020583}" type="datetimeFigureOut">
               <a:rPr lang="en-US" dirty="0"/>
-              <a:t>3/23/2021</a:t>
+              <a:t>3/24/2021</a:t>
             </a:fld>
             <a:endParaRPr lang="en-US" dirty="0"/>
           </a:p>
@@ -4812,7 +3753,7 @@
           <a:p>
             <a:fld id="{87DE6118-2437-4B30-8E3C-4D2BE6020583}" type="datetimeFigureOut">
               <a:rPr lang="en-US" dirty="0"/>
-              <a:t>3/23/2021</a:t>
+              <a:t>3/24/2021</a:t>
             </a:fld>
             <a:endParaRPr lang="en-US" dirty="0"/>
           </a:p>
@@ -4977,7 +3918,7 @@
           <a:p>
             <a:fld id="{87DE6118-2437-4B30-8E3C-4D2BE6020583}" type="datetimeFigureOut">
               <a:rPr lang="en-US" dirty="0"/>
-              <a:t>3/23/2021</a:t>
+              <a:t>3/24/2021</a:t>
             </a:fld>
             <a:endParaRPr lang="en-US" dirty="0"/>
           </a:p>
@@ -5250,7 +4191,7 @@
             <a:fld id="{87DE6118-2437-4B30-8E3C-4D2BE6020583}" type="datetimeFigureOut">
               <a:rPr lang="en-US" dirty="0"/>
               <a:pPr/>
-              <a:t>3/23/2021</a:t>
+              <a:t>3/24/2021</a:t>
             </a:fld>
             <a:endParaRPr lang="en-US" dirty="0"/>
           </a:p>
@@ -5640,7 +4581,7 @@
           <a:p>
             <a:fld id="{87DE6118-2437-4B30-8E3C-4D2BE6020583}" type="datetimeFigureOut">
               <a:rPr lang="en-US" dirty="0"/>
-              <a:t>3/23/2021</a:t>
+              <a:t>3/24/2021</a:t>
             </a:fld>
             <a:endParaRPr lang="en-US" dirty="0"/>
           </a:p>
@@ -6112,7 +5053,7 @@
           <a:p>
             <a:fld id="{87DE6118-2437-4B30-8E3C-4D2BE6020583}" type="datetimeFigureOut">
               <a:rPr lang="en-US" dirty="0"/>
-              <a:t>3/23/2021</a:t>
+              <a:t>3/24/2021</a:t>
             </a:fld>
             <a:endParaRPr lang="en-US" dirty="0"/>
           </a:p>
@@ -6225,7 +5166,7 @@
           <a:p>
             <a:fld id="{87DE6118-2437-4B30-8E3C-4D2BE6020583}" type="datetimeFigureOut">
               <a:rPr lang="en-US" dirty="0"/>
-              <a:t>3/23/2021</a:t>
+              <a:t>3/24/2021</a:t>
             </a:fld>
             <a:endParaRPr lang="en-US" dirty="0"/>
           </a:p>
@@ -6315,7 +5256,7 @@
           <a:p>
             <a:fld id="{87DE6118-2437-4B30-8E3C-4D2BE6020583}" type="datetimeFigureOut">
               <a:rPr lang="en-US" dirty="0"/>
-              <a:t>3/23/2021</a:t>
+              <a:t>3/24/2021</a:t>
             </a:fld>
             <a:endParaRPr lang="en-US" dirty="0"/>
           </a:p>
@@ -6657,7 +5598,7 @@
             <a:fld id="{87DE6118-2437-4B30-8E3C-4D2BE6020583}" type="datetimeFigureOut">
               <a:rPr lang="en-US" dirty="0"/>
               <a:pPr/>
-              <a:t>3/23/2021</a:t>
+              <a:t>3/24/2021</a:t>
             </a:fld>
             <a:endParaRPr lang="en-US" dirty="0"/>
           </a:p>
@@ -7042,7 +5983,7 @@
             <a:fld id="{87DE6118-2437-4B30-8E3C-4D2BE6020583}" type="datetimeFigureOut">
               <a:rPr lang="en-US" dirty="0"/>
               <a:pPr/>
-              <a:t>3/23/2021</a:t>
+              <a:t>3/24/2021</a:t>
             </a:fld>
             <a:endParaRPr lang="en-US" dirty="0"/>
           </a:p>
@@ -7317,7 +6258,7 @@
             <a:fld id="{87DE6118-2437-4B30-8E3C-4D2BE6020583}" type="datetimeFigureOut">
               <a:rPr lang="en-US" dirty="0"/>
               <a:pPr/>
-              <a:t>3/23/2021</a:t>
+              <a:t>3/24/2021</a:t>
             </a:fld>
             <a:endParaRPr lang="en-US" dirty="0"/>
           </a:p>
@@ -7903,6 +6844,160 @@
 </p:sld>
 </file>
 
+<file path=ppt/slides/slide10.xml><?xml version="1.0" encoding="utf-8"?>
+<p:sld xmlns:a="http://schemas.openxmlformats.org/drawingml/2006/main" xmlns:r="http://schemas.openxmlformats.org/officeDocument/2006/relationships" xmlns:p="http://schemas.openxmlformats.org/presentationml/2006/main">
+  <p:cSld>
+    <p:bg>
+      <p:bgPr>
+        <a:solidFill>
+          <a:schemeClr val="bg1"/>
+        </a:solidFill>
+        <a:effectLst/>
+      </p:bgPr>
+    </p:bg>
+    <p:spTree>
+      <p:nvGrpSpPr>
+        <p:cNvPr id="1" name=""/>
+        <p:cNvGrpSpPr/>
+        <p:nvPr/>
+      </p:nvGrpSpPr>
+      <p:grpSpPr>
+        <a:xfrm>
+          <a:off x="0" y="0"/>
+          <a:ext cx="0" cy="0"/>
+          <a:chOff x="0" y="0"/>
+          <a:chExt cx="0" cy="0"/>
+        </a:xfrm>
+      </p:grpSpPr>
+      <p:sp>
+        <p:nvSpPr>
+          <p:cNvPr id="2" name="Title 1">
+            <a:extLst>
+              <a:ext uri="{FF2B5EF4-FFF2-40B4-BE49-F238E27FC236}">
+                <a16:creationId xmlns:a16="http://schemas.microsoft.com/office/drawing/2014/main" id="{5F635CBD-33FA-45AA-8966-95248889CCBD}"/>
+              </a:ext>
+            </a:extLst>
+          </p:cNvPr>
+          <p:cNvSpPr>
+            <a:spLocks noGrp="1"/>
+          </p:cNvSpPr>
+          <p:nvPr>
+            <p:ph type="title"/>
+          </p:nvPr>
+        </p:nvSpPr>
+        <p:spPr/>
+        <p:txBody>
+          <a:bodyPr/>
+          <a:lstStyle/>
+          <a:p>
+            <a:r>
+              <a:rPr lang="en-US" dirty="0"/>
+              <a:t>Conclusions</a:t>
+            </a:r>
+          </a:p>
+        </p:txBody>
+      </p:sp>
+      <p:sp>
+        <p:nvSpPr>
+          <p:cNvPr id="3" name="Content Placeholder 2">
+            <a:extLst>
+              <a:ext uri="{FF2B5EF4-FFF2-40B4-BE49-F238E27FC236}">
+                <a16:creationId xmlns:a16="http://schemas.microsoft.com/office/drawing/2014/main" id="{0F9A5350-2FC7-462D-86A8-481A71EB5190}"/>
+              </a:ext>
+            </a:extLst>
+          </p:cNvPr>
+          <p:cNvSpPr>
+            <a:spLocks noGrp="1"/>
+          </p:cNvSpPr>
+          <p:nvPr>
+            <p:ph idx="1"/>
+          </p:nvPr>
+        </p:nvSpPr>
+        <p:spPr/>
+        <p:txBody>
+          <a:bodyPr>
+            <a:normAutofit/>
+          </a:bodyPr>
+          <a:lstStyle/>
+          <a:p>
+            <a:pPr marL="457200" indent="-457200" algn="l">
+              <a:buFont typeface="+mj-lt"/>
+              <a:buAutoNum type="arabicPeriod"/>
+            </a:pPr>
+            <a:r>
+              <a:rPr lang="en-US" sz="2400" b="0" i="0" dirty="0">
+                <a:solidFill>
+                  <a:schemeClr val="tx1"/>
+                </a:solidFill>
+                <a:effectLst/>
+                <a:latin typeface="-apple-system"/>
+              </a:rPr>
+              <a:t>For high-budget productions, go with animation.</a:t>
+            </a:r>
+          </a:p>
+          <a:p>
+            <a:pPr marL="457200" indent="-457200" algn="l">
+              <a:buFont typeface="+mj-lt"/>
+              <a:buAutoNum type="arabicPeriod"/>
+            </a:pPr>
+            <a:r>
+              <a:rPr lang="en-US" sz="2400" b="0" i="0" dirty="0">
+                <a:solidFill>
+                  <a:schemeClr val="tx1"/>
+                </a:solidFill>
+                <a:effectLst/>
+                <a:latin typeface="-apple-system"/>
+              </a:rPr>
+              <a:t>For low-budget productions, go with horror.</a:t>
+            </a:r>
+          </a:p>
+          <a:p>
+            <a:pPr marL="457200" indent="-457200" algn="l">
+              <a:buFont typeface="+mj-lt"/>
+              <a:buAutoNum type="arabicPeriod"/>
+            </a:pPr>
+            <a:r>
+              <a:rPr lang="en-US" sz="2400" b="0" i="0" dirty="0">
+                <a:solidFill>
+                  <a:schemeClr val="tx1"/>
+                </a:solidFill>
+                <a:effectLst/>
+                <a:latin typeface="-apple-system"/>
+              </a:rPr>
+              <a:t>Stay away from drama, action, and crime.</a:t>
+            </a:r>
+          </a:p>
+          <a:p>
+            <a:pPr marL="457200" indent="-457200" algn="l">
+              <a:buFont typeface="+mj-lt"/>
+              <a:buAutoNum type="arabicPeriod"/>
+            </a:pPr>
+            <a:r>
+              <a:rPr lang="en-US" sz="2400" b="0" i="0" dirty="0">
+                <a:solidFill>
+                  <a:schemeClr val="tx1"/>
+                </a:solidFill>
+                <a:effectLst/>
+                <a:latin typeface="-apple-system"/>
+              </a:rPr>
+              <a:t>Keep your movie budgets under $250M.</a:t>
+            </a:r>
+          </a:p>
+        </p:txBody>
+      </p:sp>
+    </p:spTree>
+    <p:extLst>
+      <p:ext uri="{BB962C8B-B14F-4D97-AF65-F5344CB8AC3E}">
+        <p14:creationId xmlns:p14="http://schemas.microsoft.com/office/powerpoint/2010/main" val="406045541"/>
+      </p:ext>
+    </p:extLst>
+  </p:cSld>
+  <p:clrMapOvr>
+    <a:masterClrMapping/>
+  </p:clrMapOvr>
+</p:sld>
+</file>
+
 <file path=ppt/slides/slide2.xml><?xml version="1.0" encoding="utf-8"?>
 <p:sld xmlns:a="http://schemas.openxmlformats.org/drawingml/2006/main" xmlns:r="http://schemas.openxmlformats.org/officeDocument/2006/relationships" xmlns:p="http://schemas.openxmlformats.org/presentationml/2006/main">
   <p:cSld>
@@ -8389,13 +7484,13 @@
             <p:ph idx="1"/>
             <p:extLst>
               <p:ext uri="{D42A27DB-BD31-4B8C-83A1-F6EECF244321}">
-                <p14:modId xmlns:p14="http://schemas.microsoft.com/office/powerpoint/2010/main" val="2870746595"/>
+                <p14:modId xmlns:p14="http://schemas.microsoft.com/office/powerpoint/2010/main" val="502863276"/>
               </p:ext>
             </p:extLst>
           </p:nvPr>
         </p:nvGraphicFramePr>
         <p:xfrm>
-          <a:off x="2031246" y="1965353"/>
+          <a:off x="2031246" y="2310015"/>
           <a:ext cx="8129508" cy="2927293"/>
         </p:xfrm>
         <a:graphic>
@@ -8404,6 +7499,45 @@
           </a:graphicData>
         </a:graphic>
       </p:graphicFrame>
+      <p:sp>
+        <p:nvSpPr>
+          <p:cNvPr id="3" name="TextBox 2">
+            <a:extLst>
+              <a:ext uri="{FF2B5EF4-FFF2-40B4-BE49-F238E27FC236}">
+                <a16:creationId xmlns:a16="http://schemas.microsoft.com/office/drawing/2014/main" id="{52FFCB24-4974-4962-971E-A68651A5B5A7}"/>
+              </a:ext>
+            </a:extLst>
+          </p:cNvPr>
+          <p:cNvSpPr txBox="1"/>
+          <p:nvPr/>
+        </p:nvSpPr>
+        <p:spPr>
+          <a:xfrm>
+            <a:off x="1246910" y="778781"/>
+            <a:ext cx="5445438" cy="769441"/>
+          </a:xfrm>
+          <a:prstGeom prst="rect">
+            <a:avLst/>
+          </a:prstGeom>
+          <a:noFill/>
+        </p:spPr>
+        <p:txBody>
+          <a:bodyPr wrap="square" rtlCol="0">
+            <a:spAutoFit/>
+          </a:bodyPr>
+          <a:lstStyle/>
+          <a:p>
+            <a:r>
+              <a:rPr lang="en-US" sz="4400" dirty="0">
+                <a:solidFill>
+                  <a:schemeClr val="bg1"/>
+                </a:solidFill>
+              </a:rPr>
+              <a:t>Research Questions</a:t>
+            </a:r>
+          </a:p>
+        </p:txBody>
+      </p:sp>
     </p:spTree>
     <p:extLst>
       <p:ext uri="{BB962C8B-B14F-4D97-AF65-F5344CB8AC3E}">
@@ -8418,12 +7552,12 @@
 </file>
 
 <file path=ppt/slides/slide4.xml><?xml version="1.0" encoding="utf-8"?>
-<p:sld xmlns:a="http://schemas.openxmlformats.org/drawingml/2006/main" xmlns:r="http://schemas.openxmlformats.org/officeDocument/2006/relationships" xmlns:p="http://schemas.openxmlformats.org/presentationml/2006/main" showMasterSp="0">
+<p:sld xmlns:a="http://schemas.openxmlformats.org/drawingml/2006/main" xmlns:r="http://schemas.openxmlformats.org/officeDocument/2006/relationships" xmlns:p="http://schemas.openxmlformats.org/presentationml/2006/main">
   <p:cSld>
     <p:bg>
       <p:bgPr>
         <a:solidFill>
-          <a:schemeClr val="tx1"/>
+          <a:schemeClr val="bg1"/>
         </a:solidFill>
         <a:effectLst/>
       </p:bgPr>
@@ -8452,11 +7586,11 @@
             </a:extLst>
           </p:cNvPr>
           <p:cNvPicPr>
-            <a:picLocks noChangeAspect="1" noChangeArrowheads="1"/>
+            <a:picLocks noChangeArrowheads="1"/>
           </p:cNvPicPr>
           <p:nvPr/>
         </p:nvPicPr>
-        <p:blipFill>
+        <p:blipFill rotWithShape="1">
           <a:blip r:embed="rId2">
             <a:extLst>
               <a:ext uri="{28A0092B-C50C-407E-A947-70E740481C1C}">
@@ -8464,15 +7598,13 @@
               </a:ext>
             </a:extLst>
           </a:blip>
-          <a:srcRect/>
-          <a:stretch>
-            <a:fillRect/>
-          </a:stretch>
+          <a:srcRect l="31888" r="34230"/>
+          <a:stretch/>
         </p:blipFill>
         <p:spPr bwMode="auto">
           <a:xfrm>
-            <a:off x="3161179" y="3818181"/>
-            <a:ext cx="5869633" cy="750507"/>
+            <a:off x="7590636" y="3783017"/>
+            <a:ext cx="3081528" cy="1481328"/>
           </a:xfrm>
           <a:prstGeom prst="rect">
             <a:avLst/>
@@ -8519,8 +7651,8 @@
         </p:blipFill>
         <p:spPr bwMode="auto">
           <a:xfrm>
-            <a:off x="3161179" y="2242519"/>
-            <a:ext cx="2464747" cy="1186481"/>
+            <a:off x="7590636" y="1809402"/>
+            <a:ext cx="3084589" cy="1484861"/>
           </a:xfrm>
           <a:prstGeom prst="rect">
             <a:avLst/>
@@ -8540,39 +7672,109 @@
       </p:pic>
       <p:sp>
         <p:nvSpPr>
-          <p:cNvPr id="4" name="TextBox 3">
+          <p:cNvPr id="2" name="Title 1">
             <a:extLst>
               <a:ext uri="{FF2B5EF4-FFF2-40B4-BE49-F238E27FC236}">
-                <a16:creationId xmlns:a16="http://schemas.microsoft.com/office/drawing/2014/main" id="{72371BCF-F31F-48C2-98BF-56108CA80A82}"/>
+                <a16:creationId xmlns:a16="http://schemas.microsoft.com/office/drawing/2014/main" id="{69A60AFE-1E23-437C-AEAF-3D04E774465A}"/>
               </a:ext>
             </a:extLst>
           </p:cNvPr>
-          <p:cNvSpPr txBox="1"/>
-          <p:nvPr/>
+          <p:cNvSpPr>
+            <a:spLocks noGrp="1"/>
+          </p:cNvSpPr>
+          <p:nvPr>
+            <p:ph type="title"/>
+          </p:nvPr>
+        </p:nvSpPr>
+        <p:spPr/>
+        <p:txBody>
+          <a:bodyPr/>
+          <a:lstStyle/>
+          <a:p>
+            <a:r>
+              <a:rPr lang="en-US" dirty="0"/>
+              <a:t>Data Sources</a:t>
+            </a:r>
+          </a:p>
+        </p:txBody>
+      </p:sp>
+      <p:sp>
+        <p:nvSpPr>
+          <p:cNvPr id="3" name="Content Placeholder 2">
+            <a:extLst>
+              <a:ext uri="{FF2B5EF4-FFF2-40B4-BE49-F238E27FC236}">
+                <a16:creationId xmlns:a16="http://schemas.microsoft.com/office/drawing/2014/main" id="{436C1774-626E-46F3-B6EA-73CE0A59B4BD}"/>
+              </a:ext>
+            </a:extLst>
+          </p:cNvPr>
+          <p:cNvSpPr>
+            <a:spLocks noGrp="1"/>
+          </p:cNvSpPr>
+          <p:nvPr>
+            <p:ph idx="1"/>
+          </p:nvPr>
         </p:nvSpPr>
         <p:spPr>
           <a:xfrm>
-            <a:off x="6095995" y="2112484"/>
-            <a:ext cx="3186603" cy="1446550"/>
+            <a:off x="1371600" y="2171700"/>
+            <a:ext cx="9601200" cy="3581400"/>
           </a:xfrm>
-          <a:prstGeom prst="rect">
-            <a:avLst/>
-          </a:prstGeom>
-          <a:noFill/>
         </p:spPr>
         <p:txBody>
-          <a:bodyPr wrap="square" rtlCol="0">
-            <a:spAutoFit/>
-          </a:bodyPr>
+          <a:bodyPr/>
           <a:lstStyle/>
           <a:p>
             <a:r>
-              <a:rPr lang="en-US" sz="4400" dirty="0">
-                <a:solidFill>
-                  <a:schemeClr val="bg1"/>
-                </a:solidFill>
-              </a:rPr>
-              <a:t>Data Sources</a:t>
+              <a:rPr lang="en-US" dirty="0"/>
+              <a:t>Internet Movie Database</a:t>
+            </a:r>
+          </a:p>
+          <a:p>
+            <a:pPr lvl="1"/>
+            <a:r>
+              <a:rPr lang="en-US" dirty="0"/>
+              <a:t>Large database</a:t>
+            </a:r>
+          </a:p>
+          <a:p>
+            <a:pPr lvl="1"/>
+            <a:r>
+              <a:rPr lang="en-US" b="1" dirty="0"/>
+              <a:t>Has genre information</a:t>
+            </a:r>
+          </a:p>
+          <a:p>
+            <a:pPr lvl="1"/>
+            <a:r>
+              <a:rPr lang="en-US" dirty="0"/>
+              <a:t>Subsidiary of Amazon</a:t>
+            </a:r>
+          </a:p>
+          <a:p>
+            <a:r>
+              <a:rPr lang="en-US" dirty="0"/>
+              <a:t>The Numbers</a:t>
+            </a:r>
+          </a:p>
+          <a:p>
+            <a:pPr lvl="1"/>
+            <a:r>
+              <a:rPr lang="en-US" dirty="0"/>
+              <a:t>Smaller data collection</a:t>
+            </a:r>
+          </a:p>
+          <a:p>
+            <a:pPr lvl="1"/>
+            <a:r>
+              <a:rPr lang="en-US" b="1" dirty="0"/>
+              <a:t>Has financial data</a:t>
+            </a:r>
+          </a:p>
+          <a:p>
+            <a:pPr lvl="1"/>
+            <a:r>
+              <a:rPr lang="en-US" dirty="0"/>
+              <a:t>Owned by Nash Information Services</a:t>
             </a:r>
           </a:p>
         </p:txBody>
@@ -8615,42 +7817,6 @@
           <a:chExt cx="0" cy="0"/>
         </a:xfrm>
       </p:grpSpPr>
-      <p:sp>
-        <p:nvSpPr>
-          <p:cNvPr id="50" name="Title 49">
-            <a:extLst>
-              <a:ext uri="{FF2B5EF4-FFF2-40B4-BE49-F238E27FC236}">
-                <a16:creationId xmlns:a16="http://schemas.microsoft.com/office/drawing/2014/main" id="{EAD5B334-3B87-4C9D-AE13-687B0F6E22A7}"/>
-              </a:ext>
-            </a:extLst>
-          </p:cNvPr>
-          <p:cNvSpPr>
-            <a:spLocks noGrp="1"/>
-          </p:cNvSpPr>
-          <p:nvPr>
-            <p:ph type="title"/>
-          </p:nvPr>
-        </p:nvSpPr>
-        <p:spPr>
-          <a:xfrm>
-            <a:off x="1295400" y="513522"/>
-            <a:ext cx="9601200" cy="665922"/>
-          </a:xfrm>
-        </p:spPr>
-        <p:txBody>
-          <a:bodyPr>
-            <a:normAutofit/>
-          </a:bodyPr>
-          <a:lstStyle/>
-          <a:p>
-            <a:pPr algn="ctr"/>
-            <a:r>
-              <a:rPr lang="en-US" sz="3600" dirty="0"/>
-              <a:t>ROI takes budget into account.</a:t>
-            </a:r>
-          </a:p>
-        </p:txBody>
-      </p:sp>
       <p:pic>
         <p:nvPicPr>
           <p:cNvPr id="80" name="Content Placeholder 79">
@@ -8681,8 +7847,8 @@
         </p:blipFill>
         <p:spPr>
           <a:xfrm>
-            <a:off x="6452719" y="1589598"/>
-            <a:ext cx="4196150" cy="4754880"/>
+            <a:off x="6544687" y="715135"/>
+            <a:ext cx="4785225" cy="5422392"/>
           </a:xfrm>
         </p:spPr>
       </p:pic>
@@ -8716,8 +7882,8 @@
         </p:blipFill>
         <p:spPr>
           <a:xfrm>
-            <a:off x="1295400" y="1589598"/>
-            <a:ext cx="4207561" cy="4754880"/>
+            <a:off x="862088" y="715135"/>
+            <a:ext cx="4800600" cy="5425061"/>
           </a:xfrm>
         </p:spPr>
       </p:pic>
@@ -8905,6 +8071,286 @@
 </file>
 
 <file path=ppt/slides/slide7.xml><?xml version="1.0" encoding="utf-8"?>
+<p:sld xmlns:a="http://schemas.openxmlformats.org/drawingml/2006/main" xmlns:r="http://schemas.openxmlformats.org/officeDocument/2006/relationships" xmlns:p="http://schemas.openxmlformats.org/presentationml/2006/main">
+  <p:cSld>
+    <p:bg>
+      <p:bgPr>
+        <a:solidFill>
+          <a:schemeClr val="bg1"/>
+        </a:solidFill>
+        <a:effectLst/>
+      </p:bgPr>
+    </p:bg>
+    <p:spTree>
+      <p:nvGrpSpPr>
+        <p:cNvPr id="1" name=""/>
+        <p:cNvGrpSpPr/>
+        <p:nvPr/>
+      </p:nvGrpSpPr>
+      <p:grpSpPr>
+        <a:xfrm>
+          <a:off x="0" y="0"/>
+          <a:ext cx="0" cy="0"/>
+          <a:chOff x="0" y="0"/>
+          <a:chExt cx="0" cy="0"/>
+        </a:xfrm>
+      </p:grpSpPr>
+      <p:sp useBgFill="1">
+        <p:nvSpPr>
+          <p:cNvPr id="12" name="Rectangle 11">
+            <a:extLst>
+              <a:ext uri="{FF2B5EF4-FFF2-40B4-BE49-F238E27FC236}">
+                <a16:creationId xmlns:a16="http://schemas.microsoft.com/office/drawing/2014/main" id="{3A3D0CF5-C0A0-4195-804D-B82489B1D71B}"/>
+              </a:ext>
+              <a:ext uri="{C183D7F6-B498-43B3-948B-1728B52AA6E4}">
+                <adec:decorative xmlns:adec="http://schemas.microsoft.com/office/drawing/2017/decorative" val="1"/>
+              </a:ext>
+            </a:extLst>
+          </p:cNvPr>
+          <p:cNvSpPr>
+            <a:spLocks noGrp="1" noRot="1" noChangeAspect="1" noMove="1" noResize="1" noEditPoints="1" noAdjustHandles="1" noChangeArrowheads="1" noChangeShapeType="1" noTextEdit="1"/>
+          </p:cNvSpPr>
+          <p:nvPr>
+            <p:extLst>
+              <p:ext uri="{386F3935-93C4-4BCD-93E2-E3B085C9AB24}">
+                <p16:designElem xmlns:p16="http://schemas.microsoft.com/office/powerpoint/2015/main" val="1"/>
+              </p:ext>
+            </p:extLst>
+          </p:nvPr>
+        </p:nvSpPr>
+        <p:spPr>
+          <a:xfrm>
+            <a:off x="0" y="0"/>
+            <a:ext cx="12192000" cy="6858000"/>
+          </a:xfrm>
+          <a:prstGeom prst="rect">
+            <a:avLst/>
+          </a:prstGeom>
+          <a:ln>
+            <a:noFill/>
+          </a:ln>
+        </p:spPr>
+        <p:style>
+          <a:lnRef idx="2">
+            <a:schemeClr val="accent1">
+              <a:shade val="50000"/>
+            </a:schemeClr>
+          </a:lnRef>
+          <a:fillRef idx="1">
+            <a:schemeClr val="accent1"/>
+          </a:fillRef>
+          <a:effectRef idx="0">
+            <a:schemeClr val="accent1"/>
+          </a:effectRef>
+          <a:fontRef idx="minor">
+            <a:schemeClr val="lt1"/>
+          </a:fontRef>
+        </p:style>
+        <p:txBody>
+          <a:bodyPr rtlCol="0" anchor="ctr"/>
+          <a:lstStyle/>
+          <a:p>
+            <a:pPr algn="ctr"/>
+            <a:endParaRPr lang="en-US"/>
+          </a:p>
+        </p:txBody>
+      </p:sp>
+      <p:pic>
+        <p:nvPicPr>
+          <p:cNvPr id="6" name="Graphic 5">
+            <a:extLst>
+              <a:ext uri="{FF2B5EF4-FFF2-40B4-BE49-F238E27FC236}">
+                <a16:creationId xmlns:a16="http://schemas.microsoft.com/office/drawing/2014/main" id="{87CED1B8-BCAC-47F5-85F1-0731A8B2D4E4}"/>
+              </a:ext>
+            </a:extLst>
+          </p:cNvPr>
+          <p:cNvPicPr>
+            <a:picLocks noChangeAspect="1"/>
+          </p:cNvPicPr>
+          <p:nvPr/>
+        </p:nvPicPr>
+        <p:blipFill>
+          <a:blip r:embed="rId2">
+            <a:extLst>
+              <a:ext uri="{96DAC541-7B7A-43D3-8B79-37D633B846F1}">
+                <asvg:svgBlip xmlns:asvg="http://schemas.microsoft.com/office/drawing/2016/SVG/main" r:embed="rId3"/>
+              </a:ext>
+            </a:extLst>
+          </a:blip>
+          <a:stretch>
+            <a:fillRect/>
+          </a:stretch>
+        </p:blipFill>
+        <p:spPr>
+          <a:xfrm>
+            <a:off x="6256866" y="1272551"/>
+            <a:ext cx="5291666" cy="4312897"/>
+          </a:xfrm>
+          <a:prstGeom prst="rect">
+            <a:avLst/>
+          </a:prstGeom>
+        </p:spPr>
+      </p:pic>
+      <p:pic>
+        <p:nvPicPr>
+          <p:cNvPr id="3" name="Graphic 2">
+            <a:extLst>
+              <a:ext uri="{FF2B5EF4-FFF2-40B4-BE49-F238E27FC236}">
+                <a16:creationId xmlns:a16="http://schemas.microsoft.com/office/drawing/2014/main" id="{7E7DECA7-0026-412E-8456-259757F3AFE2}"/>
+              </a:ext>
+            </a:extLst>
+          </p:cNvPr>
+          <p:cNvPicPr>
+            <a:picLocks noChangeAspect="1"/>
+          </p:cNvPicPr>
+          <p:nvPr/>
+        </p:nvPicPr>
+        <p:blipFill>
+          <a:blip r:embed="rId4">
+            <a:extLst>
+              <a:ext uri="{96DAC541-7B7A-43D3-8B79-37D633B846F1}">
+                <asvg:svgBlip xmlns:asvg="http://schemas.microsoft.com/office/drawing/2016/SVG/main" r:embed="rId5"/>
+              </a:ext>
+            </a:extLst>
+          </a:blip>
+          <a:stretch>
+            <a:fillRect/>
+          </a:stretch>
+        </p:blipFill>
+        <p:spPr>
+          <a:xfrm>
+            <a:off x="1061455" y="645837"/>
+            <a:ext cx="4457587" cy="5568696"/>
+          </a:xfrm>
+          <a:prstGeom prst="rect">
+            <a:avLst/>
+          </a:prstGeom>
+        </p:spPr>
+      </p:pic>
+    </p:spTree>
+    <p:extLst>
+      <p:ext uri="{BB962C8B-B14F-4D97-AF65-F5344CB8AC3E}">
+        <p14:creationId xmlns:p14="http://schemas.microsoft.com/office/powerpoint/2010/main" val="249905897"/>
+      </p:ext>
+    </p:extLst>
+  </p:cSld>
+  <p:clrMapOvr>
+    <a:masterClrMapping/>
+  </p:clrMapOvr>
+</p:sld>
+</file>
+
+<file path=ppt/slides/slide8.xml><?xml version="1.0" encoding="utf-8"?>
+<p:sld xmlns:a="http://schemas.openxmlformats.org/drawingml/2006/main" xmlns:r="http://schemas.openxmlformats.org/officeDocument/2006/relationships" xmlns:p="http://schemas.openxmlformats.org/presentationml/2006/main" showMasterSp="0">
+  <p:cSld>
+    <p:bg>
+      <p:bgPr>
+        <a:solidFill>
+          <a:schemeClr val="bg1"/>
+        </a:solidFill>
+        <a:effectLst/>
+      </p:bgPr>
+    </p:bg>
+    <p:spTree>
+      <p:nvGrpSpPr>
+        <p:cNvPr id="1" name=""/>
+        <p:cNvGrpSpPr/>
+        <p:nvPr/>
+      </p:nvGrpSpPr>
+      <p:grpSpPr>
+        <a:xfrm>
+          <a:off x="0" y="0"/>
+          <a:ext cx="0" cy="0"/>
+          <a:chOff x="0" y="0"/>
+          <a:chExt cx="0" cy="0"/>
+        </a:xfrm>
+      </p:grpSpPr>
+      <p:pic>
+        <p:nvPicPr>
+          <p:cNvPr id="5" name="Graphic 4">
+            <a:extLst>
+              <a:ext uri="{FF2B5EF4-FFF2-40B4-BE49-F238E27FC236}">
+                <a16:creationId xmlns:a16="http://schemas.microsoft.com/office/drawing/2014/main" id="{EE37AB10-582D-46B6-B394-040AA01A6FF4}"/>
+              </a:ext>
+            </a:extLst>
+          </p:cNvPr>
+          <p:cNvPicPr>
+            <a:picLocks noChangeAspect="1"/>
+          </p:cNvPicPr>
+          <p:nvPr/>
+        </p:nvPicPr>
+        <p:blipFill>
+          <a:blip r:embed="rId2">
+            <a:extLst>
+              <a:ext uri="{96DAC541-7B7A-43D3-8B79-37D633B846F1}">
+                <asvg:svgBlip xmlns:asvg="http://schemas.microsoft.com/office/drawing/2016/SVG/main" r:embed="rId3"/>
+              </a:ext>
+            </a:extLst>
+          </a:blip>
+          <a:stretch>
+            <a:fillRect/>
+          </a:stretch>
+        </p:blipFill>
+        <p:spPr>
+          <a:xfrm>
+            <a:off x="984651" y="618757"/>
+            <a:ext cx="4937760" cy="5855018"/>
+          </a:xfrm>
+          <a:prstGeom prst="rect">
+            <a:avLst/>
+          </a:prstGeom>
+        </p:spPr>
+      </p:pic>
+      <p:pic>
+        <p:nvPicPr>
+          <p:cNvPr id="7" name="Graphic 6">
+            <a:extLst>
+              <a:ext uri="{FF2B5EF4-FFF2-40B4-BE49-F238E27FC236}">
+                <a16:creationId xmlns:a16="http://schemas.microsoft.com/office/drawing/2014/main" id="{75076640-502D-463C-B82D-0E71D26644EA}"/>
+              </a:ext>
+            </a:extLst>
+          </p:cNvPr>
+          <p:cNvPicPr>
+            <a:picLocks noChangeAspect="1"/>
+          </p:cNvPicPr>
+          <p:nvPr/>
+        </p:nvPicPr>
+        <p:blipFill>
+          <a:blip r:embed="rId4">
+            <a:extLst>
+              <a:ext uri="{96DAC541-7B7A-43D3-8B79-37D633B846F1}">
+                <asvg:svgBlip xmlns:asvg="http://schemas.microsoft.com/office/drawing/2016/SVG/main" r:embed="rId5"/>
+              </a:ext>
+            </a:extLst>
+          </a:blip>
+          <a:stretch>
+            <a:fillRect/>
+          </a:stretch>
+        </p:blipFill>
+        <p:spPr>
+          <a:xfrm>
+            <a:off x="6629634" y="618757"/>
+            <a:ext cx="4577715" cy="5855018"/>
+          </a:xfrm>
+          <a:prstGeom prst="rect">
+            <a:avLst/>
+          </a:prstGeom>
+        </p:spPr>
+      </p:pic>
+    </p:spTree>
+    <p:extLst>
+      <p:ext uri="{BB962C8B-B14F-4D97-AF65-F5344CB8AC3E}">
+        <p14:creationId xmlns:p14="http://schemas.microsoft.com/office/powerpoint/2010/main" val="3405856754"/>
+      </p:ext>
+    </p:extLst>
+  </p:cSld>
+  <p:clrMapOvr>
+    <a:masterClrMapping/>
+  </p:clrMapOvr>
+</p:sld>
+</file>
+
+<file path=ppt/slides/slide9.xml><?xml version="1.0" encoding="utf-8"?>
 <p:sld xmlns:a="http://schemas.openxmlformats.org/drawingml/2006/main" xmlns:r="http://schemas.openxmlformats.org/officeDocument/2006/relationships" xmlns:p="http://schemas.openxmlformats.org/presentationml/2006/main" showMasterSp="0">
   <p:cSld>
     <p:bg>
@@ -8971,160 +8417,6 @@
     <p:extLst>
       <p:ext uri="{BB962C8B-B14F-4D97-AF65-F5344CB8AC3E}">
         <p14:creationId xmlns:p14="http://schemas.microsoft.com/office/powerpoint/2010/main" val="189756549"/>
-      </p:ext>
-    </p:extLst>
-  </p:cSld>
-  <p:clrMapOvr>
-    <a:masterClrMapping/>
-  </p:clrMapOvr>
-</p:sld>
-</file>
-
-<file path=ppt/slides/slide8.xml><?xml version="1.0" encoding="utf-8"?>
-<p:sld xmlns:a="http://schemas.openxmlformats.org/drawingml/2006/main" xmlns:r="http://schemas.openxmlformats.org/officeDocument/2006/relationships" xmlns:p="http://schemas.openxmlformats.org/presentationml/2006/main">
-  <p:cSld>
-    <p:bg>
-      <p:bgPr>
-        <a:solidFill>
-          <a:schemeClr val="bg1"/>
-        </a:solidFill>
-        <a:effectLst/>
-      </p:bgPr>
-    </p:bg>
-    <p:spTree>
-      <p:nvGrpSpPr>
-        <p:cNvPr id="1" name=""/>
-        <p:cNvGrpSpPr/>
-        <p:nvPr/>
-      </p:nvGrpSpPr>
-      <p:grpSpPr>
-        <a:xfrm>
-          <a:off x="0" y="0"/>
-          <a:ext cx="0" cy="0"/>
-          <a:chOff x="0" y="0"/>
-          <a:chExt cx="0" cy="0"/>
-        </a:xfrm>
-      </p:grpSpPr>
-      <p:sp>
-        <p:nvSpPr>
-          <p:cNvPr id="2" name="Title 1">
-            <a:extLst>
-              <a:ext uri="{FF2B5EF4-FFF2-40B4-BE49-F238E27FC236}">
-                <a16:creationId xmlns:a16="http://schemas.microsoft.com/office/drawing/2014/main" id="{5F635CBD-33FA-45AA-8966-95248889CCBD}"/>
-              </a:ext>
-            </a:extLst>
-          </p:cNvPr>
-          <p:cNvSpPr>
-            <a:spLocks noGrp="1"/>
-          </p:cNvSpPr>
-          <p:nvPr>
-            <p:ph type="title"/>
-          </p:nvPr>
-        </p:nvSpPr>
-        <p:spPr/>
-        <p:txBody>
-          <a:bodyPr/>
-          <a:lstStyle/>
-          <a:p>
-            <a:r>
-              <a:rPr lang="en-US" dirty="0"/>
-              <a:t>Conclusions</a:t>
-            </a:r>
-          </a:p>
-        </p:txBody>
-      </p:sp>
-      <p:sp>
-        <p:nvSpPr>
-          <p:cNvPr id="3" name="Content Placeholder 2">
-            <a:extLst>
-              <a:ext uri="{FF2B5EF4-FFF2-40B4-BE49-F238E27FC236}">
-                <a16:creationId xmlns:a16="http://schemas.microsoft.com/office/drawing/2014/main" id="{0F9A5350-2FC7-462D-86A8-481A71EB5190}"/>
-              </a:ext>
-            </a:extLst>
-          </p:cNvPr>
-          <p:cNvSpPr>
-            <a:spLocks noGrp="1"/>
-          </p:cNvSpPr>
-          <p:nvPr>
-            <p:ph idx="1"/>
-          </p:nvPr>
-        </p:nvSpPr>
-        <p:spPr/>
-        <p:txBody>
-          <a:bodyPr>
-            <a:normAutofit/>
-          </a:bodyPr>
-          <a:lstStyle/>
-          <a:p>
-            <a:pPr marL="457200" indent="-457200" algn="l">
-              <a:buFont typeface="+mj-lt"/>
-              <a:buAutoNum type="arabicPeriod"/>
-            </a:pPr>
-            <a:r>
-              <a:rPr lang="en-US" sz="2400" b="0" i="0" dirty="0">
-                <a:solidFill>
-                  <a:schemeClr val="tx1"/>
-                </a:solidFill>
-                <a:effectLst/>
-                <a:latin typeface="-apple-system"/>
-              </a:rPr>
-              <a:t>For high-budget productions, go with animation.</a:t>
-            </a:r>
-          </a:p>
-          <a:p>
-            <a:pPr marL="457200" indent="-457200" algn="l">
-              <a:buFont typeface="+mj-lt"/>
-              <a:buAutoNum type="arabicPeriod"/>
-            </a:pPr>
-            <a:r>
-              <a:rPr lang="en-US" sz="2400" b="0" i="0" dirty="0">
-                <a:solidFill>
-                  <a:schemeClr val="tx1"/>
-                </a:solidFill>
-                <a:effectLst/>
-                <a:latin typeface="-apple-system"/>
-              </a:rPr>
-              <a:t>For low-budget productions, go with horror.</a:t>
-            </a:r>
-          </a:p>
-          <a:p>
-            <a:pPr marL="457200" indent="-457200" algn="l">
-              <a:buFont typeface="+mj-lt"/>
-              <a:buAutoNum type="arabicPeriod"/>
-            </a:pPr>
-            <a:r>
-              <a:rPr lang="en-US" sz="2400" b="0" i="0" dirty="0">
-                <a:solidFill>
-                  <a:schemeClr val="tx1"/>
-                </a:solidFill>
-                <a:effectLst/>
-                <a:latin typeface="-apple-system"/>
-              </a:rPr>
-              <a:t>Stay away from drama, action, and crime.</a:t>
-            </a:r>
-          </a:p>
-          <a:p>
-            <a:pPr marL="457200" indent="-457200" algn="l">
-              <a:buFont typeface="+mj-lt"/>
-              <a:buAutoNum type="arabicPeriod"/>
-            </a:pPr>
-            <a:r>
-              <a:rPr lang="en-US" sz="2400" b="0" i="0" dirty="0">
-                <a:solidFill>
-                  <a:schemeClr val="tx1"/>
-                </a:solidFill>
-                <a:effectLst/>
-                <a:latin typeface="-apple-system"/>
-              </a:rPr>
-              <a:t>Keep your movie budgets under $250M.</a:t>
-            </a:r>
-          </a:p>
-        </p:txBody>
-      </p:sp>
-    </p:spTree>
-    <p:extLst>
-      <p:ext uri="{BB962C8B-B14F-4D97-AF65-F5344CB8AC3E}">
-        <p14:creationId xmlns:p14="http://schemas.microsoft.com/office/powerpoint/2010/main" val="406045541"/>
       </p:ext>
     </p:extLst>
   </p:cSld>

</xml_diff>